<commit_message>
Integrate 12 engineering principles from Second Brain methodology into all 3 decks
Day 1 (86 slides): 4 principles woven into business user flow
Day 2 (88 slides): 4 principles woven into fundamentals flow
Day 3 (86 slides): 4 principles woven into advanced flow

Source: Nate B Jones - Why 2026 Is the Year to Build a Second Brain
Each principle includes concept + demo tie-in + lab tie-in (~60 min/day)
</commit_message>
<xml_diff>
--- a/slides/Day1_Claude_for_Business.pptx
+++ b/slides/Day1_Claude_for_Business.pptx
@@ -17,6 +17,7 @@
     <p:sldId id="262" r:id="rId8"/>
     <p:sldId id="263" r:id="rId9"/>
     <p:sldId id="264" r:id="rId10"/>
+    <p:sldId id="338" r:id="rId90"/>
     <p:sldId id="265" r:id="rId11"/>
     <p:sldId id="266" r:id="rId12"/>
     <p:sldId id="267" r:id="rId13"/>
@@ -38,18 +39,21 @@
     <p:sldId id="280" r:id="rId26"/>
     <p:sldId id="281" r:id="rId27"/>
     <p:sldId id="282" r:id="rId28"/>
+    <p:sldId id="339" r:id="rId91"/>
     <p:sldId id="283" r:id="rId29"/>
     <p:sldId id="284" r:id="rId30"/>
     <p:sldId id="285" r:id="rId31"/>
     <p:sldId id="286" r:id="rId32"/>
     <p:sldId id="287" r:id="rId33"/>
     <p:sldId id="288" r:id="rId34"/>
+    <p:sldId id="340" r:id="rId92"/>
     <p:sldId id="289" r:id="rId35"/>
     <p:sldId id="290" r:id="rId36"/>
     <p:sldId id="291" r:id="rId37"/>
     <p:sldId id="292" r:id="rId38"/>
     <p:sldId id="293" r:id="rId39"/>
     <p:sldId id="294" r:id="rId40"/>
+    <p:sldId id="341" r:id="rId93"/>
     <p:sldId id="295" r:id="rId41"/>
     <p:sldId id="296" r:id="rId42"/>
     <p:sldId id="297" r:id="rId43"/>
@@ -9486,6 +9490,106 @@
 </p:notes>
 </file>
 
+<file path=ppt/notesSlides/notesSlide70.xml><?xml version="1.0" encoding="utf-8"?>
+<p:notes xmlns:a="http://schemas.openxmlformats.org/drawingml/2006/main" xmlns:p="http://schemas.openxmlformats.org/presentationml/2006/main" xmlns:r="http://schemas.openxmlformats.org/officeDocument/2006/relationships">
+  <p:cSld>
+    <p:spTree>
+      <p:nvGrpSpPr>
+        <p:cNvPr id="1" name=""/>
+        <p:cNvGrpSpPr/>
+        <p:nvPr/>
+      </p:nvGrpSpPr>
+      <p:grpSpPr>
+        <a:xfrm>
+          <a:off x="0" y="0"/>
+          <a:ext cx="0" cy="0"/>
+          <a:chOff x="0" y="0"/>
+          <a:chExt cx="0" cy="0"/>
+        </a:xfrm>
+      </p:grpSpPr>
+    </p:spTree>
+  </p:cSld>
+  <p:clrMapOvr>
+    <a:masterClrMapping/>
+  </p:clrMapOvr>
+</p:notes>
+</file>
+
+<file path=ppt/notesSlides/notesSlide71.xml><?xml version="1.0" encoding="utf-8"?>
+<p:notes xmlns:a="http://schemas.openxmlformats.org/drawingml/2006/main" xmlns:p="http://schemas.openxmlformats.org/presentationml/2006/main" xmlns:r="http://schemas.openxmlformats.org/officeDocument/2006/relationships">
+  <p:cSld>
+    <p:spTree>
+      <p:nvGrpSpPr>
+        <p:cNvPr id="1" name=""/>
+        <p:cNvGrpSpPr/>
+        <p:nvPr/>
+      </p:nvGrpSpPr>
+      <p:grpSpPr>
+        <a:xfrm>
+          <a:off x="0" y="0"/>
+          <a:ext cx="0" cy="0"/>
+          <a:chOff x="0" y="0"/>
+          <a:chExt cx="0" cy="0"/>
+        </a:xfrm>
+      </p:grpSpPr>
+    </p:spTree>
+  </p:cSld>
+  <p:clrMapOvr>
+    <a:masterClrMapping/>
+  </p:clrMapOvr>
+</p:notes>
+</file>
+
+<file path=ppt/notesSlides/notesSlide72.xml><?xml version="1.0" encoding="utf-8"?>
+<p:notes xmlns:a="http://schemas.openxmlformats.org/drawingml/2006/main" xmlns:p="http://schemas.openxmlformats.org/presentationml/2006/main" xmlns:r="http://schemas.openxmlformats.org/officeDocument/2006/relationships">
+  <p:cSld>
+    <p:spTree>
+      <p:nvGrpSpPr>
+        <p:cNvPr id="1" name=""/>
+        <p:cNvGrpSpPr/>
+        <p:nvPr/>
+      </p:nvGrpSpPr>
+      <p:grpSpPr>
+        <a:xfrm>
+          <a:off x="0" y="0"/>
+          <a:ext cx="0" cy="0"/>
+          <a:chOff x="0" y="0"/>
+          <a:chExt cx="0" cy="0"/>
+        </a:xfrm>
+      </p:grpSpPr>
+    </p:spTree>
+  </p:cSld>
+  <p:clrMapOvr>
+    <a:masterClrMapping/>
+  </p:clrMapOvr>
+</p:notes>
+</file>
+
+<file path=ppt/notesSlides/notesSlide73.xml><?xml version="1.0" encoding="utf-8"?>
+<p:notes xmlns:a="http://schemas.openxmlformats.org/drawingml/2006/main" xmlns:p="http://schemas.openxmlformats.org/presentationml/2006/main" xmlns:r="http://schemas.openxmlformats.org/officeDocument/2006/relationships">
+  <p:cSld>
+    <p:spTree>
+      <p:nvGrpSpPr>
+        <p:cNvPr id="1" name=""/>
+        <p:cNvGrpSpPr/>
+        <p:nvPr/>
+      </p:nvGrpSpPr>
+      <p:grpSpPr>
+        <a:xfrm>
+          <a:off x="0" y="0"/>
+          <a:ext cx="0" cy="0"/>
+          <a:chOff x="0" y="0"/>
+          <a:chExt cx="0" cy="0"/>
+        </a:xfrm>
+      </p:grpSpPr>
+    </p:spTree>
+  </p:cSld>
+  <p:clrMapOvr>
+    <a:masterClrMapping/>
+  </p:clrMapOvr>
+</p:notes>
+</file>
+
 <file path=ppt/notesSlides/notesSlide8.xml><?xml version="1.0" encoding="utf-8"?>
 <p:notes xmlns:a="http://schemas.openxmlformats.org/drawingml/2006/main" xmlns:r="http://schemas.openxmlformats.org/officeDocument/2006/relationships" xmlns:p="http://schemas.openxmlformats.org/presentationml/2006/main">
   <p:cSld>
@@ -15039,7 +15143,7 @@
 </file>
 
 <file path=ppt/slides/slide18.xml><?xml version="1.0" encoding="utf-8"?>
-<p:sld xmlns:a="http://schemas.openxmlformats.org/drawingml/2006/main" xmlns:r="http://schemas.openxmlformats.org/officeDocument/2006/relationships" xmlns:p="http://schemas.openxmlformats.org/presentationml/2006/main">
+<p:sld xmlns:a="http://schemas.openxmlformats.org/drawingml/2006/main" xmlns:p="http://schemas.openxmlformats.org/presentationml/2006/main" xmlns:r="http://schemas.openxmlformats.org/officeDocument/2006/relationships">
   <p:cSld>
     <p:bg>
       <p:bgPr>
@@ -15055,14 +15159,7 @@
         <p:cNvGrpSpPr/>
         <p:nvPr/>
       </p:nvGrpSpPr>
-      <p:grpSpPr>
-        <a:xfrm>
-          <a:off x="0" y="0"/>
-          <a:ext cx="0" cy="0"/>
-          <a:chOff x="0" y="0"/>
-          <a:chExt cx="0" cy="0"/>
-        </a:xfrm>
-      </p:grpSpPr>
+      <p:grpSpPr/>
       <p:sp>
         <p:nvSpPr>
           <p:cNvPr id="2" name="TextBox 1"/>
@@ -15071,8 +15168,8 @@
         </p:nvSpPr>
         <p:spPr>
           <a:xfrm>
-            <a:off x="731520" y="2286000"/>
-            <a:ext cx="10728655" cy="1371600"/>
+            <a:off x="457200" y="457200"/>
+            <a:ext cx="11277600" cy="731520"/>
           </a:xfrm>
           <a:prstGeom prst="rect">
             <a:avLst/>
@@ -15080,34 +15177,77 @@
           <a:noFill/>
         </p:spPr>
         <p:txBody>
-          <a:bodyPr wrap="square">
+          <a:bodyPr wrap="none">
             <a:spAutoFit/>
           </a:bodyPr>
           <a:lstStyle/>
           <a:p>
             <a:pPr algn="ctr">
-              <a:defRPr sz="5200" b="1">
+              <a:defRPr sz="3600" b="1">
                 <a:solidFill>
                   <a:srgbClr val="FFFFFF"/>
                 </a:solidFill>
               </a:defRPr>
             </a:pPr>
             <a:r>
-              <a:t>What are Projects?</a:t>
-            </a:r>
-          </a:p>
-        </p:txBody>
-      </p:sp>
-      <p:sp>
-        <p:nvSpPr>
-          <p:cNvPr id="3" name="TextBox 2"/>
+              <a:t>Writing Your Personal Preferences</a:t>
+            </a:r>
+          </a:p>
+        </p:txBody>
+      </p:sp>
+      <p:sp>
+        <p:nvSpPr>
+          <p:cNvPr id="3" name="Rounded Rectangle 2"/>
+          <p:cNvSpPr/>
+          <p:nvPr/>
+        </p:nvSpPr>
+        <p:spPr>
+          <a:xfrm>
+            <a:off x="914400" y="1645920"/>
+            <a:ext cx="10363200" cy="4114800"/>
+          </a:xfrm>
+          <a:prstGeom prst="roundRect">
+            <a:avLst/>
+          </a:prstGeom>
+          <a:solidFill>
+            <a:srgbClr val="1E1E2E"/>
+          </a:solidFill>
+          <a:ln>
+            <a:noFill/>
+          </a:ln>
+        </p:spPr>
+        <p:style>
+          <a:lnRef idx="1">
+            <a:schemeClr val="accent1"/>
+          </a:lnRef>
+          <a:fillRef idx="3">
+            <a:schemeClr val="accent1"/>
+          </a:fillRef>
+          <a:effectRef idx="2">
+            <a:schemeClr val="accent1"/>
+          </a:effectRef>
+          <a:fontRef idx="minor">
+            <a:schemeClr val="lt1"/>
+          </a:fontRef>
+        </p:style>
+        <p:txBody>
+          <a:bodyPr rtlCol="0" anchor="ctr"/>
+          <a:lstStyle/>
+          <a:p>
+            <a:pPr algn="ctr"/>
+          </a:p>
+        </p:txBody>
+      </p:sp>
+      <p:sp>
+        <p:nvSpPr>
+          <p:cNvPr id="4" name="TextBox 3"/>
           <p:cNvSpPr txBox="1"/>
           <p:nvPr/>
         </p:nvSpPr>
         <p:spPr>
           <a:xfrm>
-            <a:off x="914400" y="3840480"/>
-            <a:ext cx="10362895" cy="914400"/>
+            <a:off x="1097280" y="1783080"/>
+            <a:ext cx="1828800" cy="365760"/>
           </a:xfrm>
           <a:prstGeom prst="rect">
             <a:avLst/>
@@ -15115,20 +15255,78 @@
           <a:noFill/>
         </p:spPr>
         <p:txBody>
-          <a:bodyPr wrap="square">
+          <a:bodyPr wrap="none">
             <a:spAutoFit/>
           </a:bodyPr>
           <a:lstStyle/>
           <a:p>
-            <a:pPr algn="ctr">
-              <a:defRPr sz="2400">
-                <a:solidFill>
-                  <a:srgbClr val="8B95A5"/>
-                </a:solidFill>
-              </a:defRPr>
-            </a:pPr>
-            <a:r>
-              <a:t>Scoped knowledge bases for specific workstreams</a:t>
+            <a:pPr>
+              <a:defRPr sz="1200" b="1">
+                <a:solidFill>
+                  <a:srgbClr val="00D4AA"/>
+                </a:solidFill>
+              </a:defRPr>
+            </a:pPr>
+            <a:r>
+              <a:t>TEXT</a:t>
+            </a:r>
+          </a:p>
+        </p:txBody>
+      </p:sp>
+      <p:sp>
+        <p:nvSpPr>
+          <p:cNvPr id="5" name="TextBox 4"/>
+          <p:cNvSpPr txBox="1"/>
+          <p:nvPr/>
+        </p:nvSpPr>
+        <p:spPr>
+          <a:xfrm>
+            <a:off x="1097280" y="2194560"/>
+            <a:ext cx="9997440" cy="3291840"/>
+          </a:xfrm>
+          <a:prstGeom prst="rect">
+            <a:avLst/>
+          </a:prstGeom>
+          <a:noFill/>
+        </p:spPr>
+        <p:txBody>
+          <a:bodyPr wrap="none">
+            <a:spAutoFit/>
+          </a:bodyPr>
+          <a:lstStyle/>
+          <a:p>
+            <a:pPr>
+              <a:defRPr sz="1800">
+                <a:solidFill>
+                  <a:srgbClr val="FFFFFF"/>
+                </a:solidFill>
+                <a:latin typeface="Consolas"/>
+              </a:defRPr>
+            </a:pPr>
+            <a:r>
+              <a:t>TEMPLATE — Paste into Settings &gt; Profile:</a:t>
+            </a:r>
+            <a:br/>
+            <a:br/>
+            <a:r>
+              <a:t>I am a [your role] at [company type] in [industry].</a:t>
+            </a:r>
+            <a:br/>
+            <a:r>
+              <a:t>My expertise: [your areas of strength].</a:t>
+            </a:r>
+            <a:br/>
+            <a:r>
+              <a:t>My team: [who you work with, their roles].</a:t>
+            </a:r>
+            <a:br/>
+            <a:br/>
+            <a:r>
+              <a:t>Communication style: [concise/detailed], [formal/casual].</a:t>
+            </a:r>
+            <a:br/>
+            <a:r>
+              <a:t>Always include: [actionable next steps / data / examples].</a:t>
             </a:r>
           </a:p>
         </p:txBody>
@@ -15167,8 +15365,8 @@
         </p:nvSpPr>
         <p:spPr>
           <a:xfrm>
-            <a:off x="457200" y="457200"/>
-            <a:ext cx="11277600" cy="731520"/>
+            <a:off x="457200" y="731520"/>
+            <a:ext cx="11277600" cy="914400"/>
           </a:xfrm>
           <a:prstGeom prst="rect">
             <a:avLst/>
@@ -15182,14 +15380,14 @@
           <a:lstStyle/>
           <a:p>
             <a:pPr algn="ctr">
-              <a:defRPr sz="3600" b="1">
+              <a:defRPr sz="4000" b="1">
                 <a:solidFill>
                   <a:srgbClr val="FFFFFF"/>
                 </a:solidFill>
               </a:defRPr>
             </a:pPr>
             <a:r>
-              <a:t>Writing Your Personal Preferences</a:t>
+              <a:t>Settings Deep Dive</a:t>
             </a:r>
           </a:p>
         </p:txBody>
@@ -15202,17 +15400,19 @@
         </p:nvSpPr>
         <p:spPr>
           <a:xfrm>
-            <a:off x="914400" y="1645920"/>
-            <a:ext cx="10363200" cy="4114800"/>
+            <a:off x="2301240" y="2011680"/>
+            <a:ext cx="2286000" cy="3200400"/>
           </a:xfrm>
           <a:prstGeom prst="roundRect">
             <a:avLst/>
           </a:prstGeom>
           <a:solidFill>
-            <a:srgbClr val="1E1E2E"/>
+            <a:srgbClr val="141A26"/>
           </a:solidFill>
-          <a:ln>
-            <a:noFill/>
+          <a:ln w="25400">
+            <a:solidFill>
+              <a:srgbClr val="00D4AA"/>
+            </a:solidFill>
           </a:ln>
         </p:spPr>
         <p:style>
@@ -15239,14 +15439,57 @@
       </p:sp>
       <p:sp>
         <p:nvSpPr>
-          <p:cNvPr id="4" name="TextBox 3"/>
+          <p:cNvPr id="4" name="Oval 3"/>
+          <p:cNvSpPr/>
+          <p:nvPr/>
+        </p:nvSpPr>
+        <p:spPr>
+          <a:xfrm>
+            <a:off x="2987040" y="2468880"/>
+            <a:ext cx="914400" cy="914400"/>
+          </a:xfrm>
+          <a:prstGeom prst="ellipse">
+            <a:avLst/>
+          </a:prstGeom>
+          <a:solidFill>
+            <a:srgbClr val="00D4AA"/>
+          </a:solidFill>
+          <a:ln>
+            <a:noFill/>
+          </a:ln>
+        </p:spPr>
+        <p:style>
+          <a:lnRef idx="1">
+            <a:schemeClr val="accent1"/>
+          </a:lnRef>
+          <a:fillRef idx="3">
+            <a:schemeClr val="accent1"/>
+          </a:fillRef>
+          <a:effectRef idx="2">
+            <a:schemeClr val="accent1"/>
+          </a:effectRef>
+          <a:fontRef idx="minor">
+            <a:schemeClr val="lt1"/>
+          </a:fontRef>
+        </p:style>
+        <p:txBody>
+          <a:bodyPr rtlCol="0" anchor="ctr"/>
+          <a:lstStyle/>
+          <a:p>
+            <a:pPr algn="ctr"/>
+          </a:p>
+        </p:txBody>
+      </p:sp>
+      <p:sp>
+        <p:nvSpPr>
+          <p:cNvPr id="5" name="TextBox 4"/>
           <p:cNvSpPr txBox="1"/>
           <p:nvPr/>
         </p:nvSpPr>
         <p:spPr>
           <a:xfrm>
-            <a:off x="1097280" y="1783080"/>
-            <a:ext cx="1828800" cy="365760"/>
+            <a:off x="2987040" y="2468880"/>
+            <a:ext cx="914400" cy="914400"/>
           </a:xfrm>
           <a:prstGeom prst="rect">
             <a:avLst/>
@@ -15254,34 +15497,34 @@
           <a:noFill/>
         </p:spPr>
         <p:txBody>
-          <a:bodyPr wrap="none">
+          <a:bodyPr wrap="none" anchor="ctr">
             <a:spAutoFit/>
           </a:bodyPr>
           <a:lstStyle/>
           <a:p>
-            <a:pPr>
-              <a:defRPr sz="1200" b="1">
-                <a:solidFill>
-                  <a:srgbClr val="00D4AA"/>
-                </a:solidFill>
-              </a:defRPr>
-            </a:pPr>
-            <a:r>
-              <a:t>TEXT</a:t>
-            </a:r>
-          </a:p>
-        </p:txBody>
-      </p:sp>
-      <p:sp>
-        <p:nvSpPr>
-          <p:cNvPr id="5" name="TextBox 4"/>
+            <a:pPr algn="ctr">
+              <a:defRPr sz="3600" b="1">
+                <a:solidFill>
+                  <a:srgbClr val="0B0F1A"/>
+                </a:solidFill>
+              </a:defRPr>
+            </a:pPr>
+            <a:r>
+              <a:t>👤</a:t>
+            </a:r>
+          </a:p>
+        </p:txBody>
+      </p:sp>
+      <p:sp>
+        <p:nvSpPr>
+          <p:cNvPr id="6" name="TextBox 5"/>
           <p:cNvSpPr txBox="1"/>
           <p:nvPr/>
         </p:nvSpPr>
         <p:spPr>
           <a:xfrm>
-            <a:off x="1097280" y="2194560"/>
-            <a:ext cx="9997440" cy="3291840"/>
+            <a:off x="2392680" y="3657600"/>
+            <a:ext cx="2103120" cy="1371600"/>
           </a:xfrm>
           <a:prstGeom prst="rect">
             <a:avLst/>
@@ -15289,44 +15532,328 @@
           <a:noFill/>
         </p:spPr>
         <p:txBody>
-          <a:bodyPr wrap="none">
+          <a:bodyPr wrap="square">
+            <a:normAutofit/>
+          </a:bodyPr>
+          <a:lstStyle/>
+          <a:p>
+            <a:pPr algn="ctr">
+              <a:defRPr sz="2000" b="1">
+                <a:solidFill>
+                  <a:srgbClr val="FFFFFF"/>
+                </a:solidFill>
+              </a:defRPr>
+            </a:pPr>
+          </a:p>
+        </p:txBody>
+      </p:sp>
+      <p:sp>
+        <p:nvSpPr>
+          <p:cNvPr id="7" name="Rounded Rectangle 6"/>
+          <p:cNvSpPr/>
+          <p:nvPr/>
+        </p:nvSpPr>
+        <p:spPr>
+          <a:xfrm>
+            <a:off x="4953000" y="2011680"/>
+            <a:ext cx="2286000" cy="3200400"/>
+          </a:xfrm>
+          <a:prstGeom prst="roundRect">
+            <a:avLst/>
+          </a:prstGeom>
+          <a:solidFill>
+            <a:srgbClr val="141A26"/>
+          </a:solidFill>
+          <a:ln w="25400">
+            <a:solidFill>
+              <a:srgbClr val="E86B4A"/>
+            </a:solidFill>
+          </a:ln>
+        </p:spPr>
+        <p:style>
+          <a:lnRef idx="1">
+            <a:schemeClr val="accent1"/>
+          </a:lnRef>
+          <a:fillRef idx="3">
+            <a:schemeClr val="accent1"/>
+          </a:fillRef>
+          <a:effectRef idx="2">
+            <a:schemeClr val="accent1"/>
+          </a:effectRef>
+          <a:fontRef idx="minor">
+            <a:schemeClr val="lt1"/>
+          </a:fontRef>
+        </p:style>
+        <p:txBody>
+          <a:bodyPr rtlCol="0" anchor="ctr"/>
+          <a:lstStyle/>
+          <a:p>
+            <a:pPr algn="ctr"/>
+          </a:p>
+        </p:txBody>
+      </p:sp>
+      <p:sp>
+        <p:nvSpPr>
+          <p:cNvPr id="8" name="Oval 7"/>
+          <p:cNvSpPr/>
+          <p:nvPr/>
+        </p:nvSpPr>
+        <p:spPr>
+          <a:xfrm>
+            <a:off x="5638800" y="2468880"/>
+            <a:ext cx="914400" cy="914400"/>
+          </a:xfrm>
+          <a:prstGeom prst="ellipse">
+            <a:avLst/>
+          </a:prstGeom>
+          <a:solidFill>
+            <a:srgbClr val="E86B4A"/>
+          </a:solidFill>
+          <a:ln>
+            <a:noFill/>
+          </a:ln>
+        </p:spPr>
+        <p:style>
+          <a:lnRef idx="1">
+            <a:schemeClr val="accent1"/>
+          </a:lnRef>
+          <a:fillRef idx="3">
+            <a:schemeClr val="accent1"/>
+          </a:fillRef>
+          <a:effectRef idx="2">
+            <a:schemeClr val="accent1"/>
+          </a:effectRef>
+          <a:fontRef idx="minor">
+            <a:schemeClr val="lt1"/>
+          </a:fontRef>
+        </p:style>
+        <p:txBody>
+          <a:bodyPr rtlCol="0" anchor="ctr"/>
+          <a:lstStyle/>
+          <a:p>
+            <a:pPr algn="ctr"/>
+          </a:p>
+        </p:txBody>
+      </p:sp>
+      <p:sp>
+        <p:nvSpPr>
+          <p:cNvPr id="9" name="TextBox 8"/>
+          <p:cNvSpPr txBox="1"/>
+          <p:nvPr/>
+        </p:nvSpPr>
+        <p:spPr>
+          <a:xfrm>
+            <a:off x="5638800" y="2468880"/>
+            <a:ext cx="914400" cy="914400"/>
+          </a:xfrm>
+          <a:prstGeom prst="rect">
+            <a:avLst/>
+          </a:prstGeom>
+          <a:noFill/>
+        </p:spPr>
+        <p:txBody>
+          <a:bodyPr wrap="none" anchor="ctr">
             <a:spAutoFit/>
           </a:bodyPr>
           <a:lstStyle/>
           <a:p>
-            <a:pPr>
-              <a:defRPr sz="1800">
+            <a:pPr algn="ctr">
+              <a:defRPr sz="3600" b="1">
+                <a:solidFill>
+                  <a:srgbClr val="0B0F1A"/>
+                </a:solidFill>
+              </a:defRPr>
+            </a:pPr>
+            <a:r>
+              <a:t>🔒</a:t>
+            </a:r>
+          </a:p>
+        </p:txBody>
+      </p:sp>
+      <p:sp>
+        <p:nvSpPr>
+          <p:cNvPr id="10" name="TextBox 9"/>
+          <p:cNvSpPr txBox="1"/>
+          <p:nvPr/>
+        </p:nvSpPr>
+        <p:spPr>
+          <a:xfrm>
+            <a:off x="5044440" y="3657600"/>
+            <a:ext cx="2103120" cy="1371600"/>
+          </a:xfrm>
+          <a:prstGeom prst="rect">
+            <a:avLst/>
+          </a:prstGeom>
+          <a:noFill/>
+        </p:spPr>
+        <p:txBody>
+          <a:bodyPr wrap="square">
+            <a:normAutofit/>
+          </a:bodyPr>
+          <a:lstStyle/>
+          <a:p>
+            <a:pPr algn="ctr">
+              <a:defRPr sz="2000" b="1">
                 <a:solidFill>
                   <a:srgbClr val="FFFFFF"/>
                 </a:solidFill>
-                <a:latin typeface="Consolas"/>
-              </a:defRPr>
-            </a:pPr>
-            <a:r>
-              <a:t>TEMPLATE — Paste into Settings &gt; Profile:</a:t>
-            </a:r>
-            <a:br/>
-            <a:br/>
-            <a:r>
-              <a:t>I am a [your role] at [company type] in [industry].</a:t>
-            </a:r>
-            <a:br/>
-            <a:r>
-              <a:t>My expertise: [your areas of strength].</a:t>
-            </a:r>
-            <a:br/>
-            <a:r>
-              <a:t>My team: [who you work with, their roles].</a:t>
-            </a:r>
-            <a:br/>
-            <a:br/>
-            <a:r>
-              <a:t>Communication style: [concise/detailed], [formal/casual].</a:t>
-            </a:r>
-            <a:br/>
-            <a:r>
-              <a:t>Always include: [actionable next steps / data / examples].</a:t>
-            </a:r>
+              </a:defRPr>
+            </a:pPr>
+          </a:p>
+        </p:txBody>
+      </p:sp>
+      <p:sp>
+        <p:nvSpPr>
+          <p:cNvPr id="11" name="Rounded Rectangle 10"/>
+          <p:cNvSpPr/>
+          <p:nvPr/>
+        </p:nvSpPr>
+        <p:spPr>
+          <a:xfrm>
+            <a:off x="7604760" y="2011680"/>
+            <a:ext cx="2286000" cy="3200400"/>
+          </a:xfrm>
+          <a:prstGeom prst="roundRect">
+            <a:avLst/>
+          </a:prstGeom>
+          <a:solidFill>
+            <a:srgbClr val="141A26"/>
+          </a:solidFill>
+          <a:ln w="25400">
+            <a:solidFill>
+              <a:srgbClr val="10B981"/>
+            </a:solidFill>
+          </a:ln>
+        </p:spPr>
+        <p:style>
+          <a:lnRef idx="1">
+            <a:schemeClr val="accent1"/>
+          </a:lnRef>
+          <a:fillRef idx="3">
+            <a:schemeClr val="accent1"/>
+          </a:fillRef>
+          <a:effectRef idx="2">
+            <a:schemeClr val="accent1"/>
+          </a:effectRef>
+          <a:fontRef idx="minor">
+            <a:schemeClr val="lt1"/>
+          </a:fontRef>
+        </p:style>
+        <p:txBody>
+          <a:bodyPr rtlCol="0" anchor="ctr"/>
+          <a:lstStyle/>
+          <a:p>
+            <a:pPr algn="ctr"/>
+          </a:p>
+        </p:txBody>
+      </p:sp>
+      <p:sp>
+        <p:nvSpPr>
+          <p:cNvPr id="12" name="Oval 11"/>
+          <p:cNvSpPr/>
+          <p:nvPr/>
+        </p:nvSpPr>
+        <p:spPr>
+          <a:xfrm>
+            <a:off x="8290560" y="2468880"/>
+            <a:ext cx="914400" cy="914400"/>
+          </a:xfrm>
+          <a:prstGeom prst="ellipse">
+            <a:avLst/>
+          </a:prstGeom>
+          <a:solidFill>
+            <a:srgbClr val="10B981"/>
+          </a:solidFill>
+          <a:ln>
+            <a:noFill/>
+          </a:ln>
+        </p:spPr>
+        <p:style>
+          <a:lnRef idx="1">
+            <a:schemeClr val="accent1"/>
+          </a:lnRef>
+          <a:fillRef idx="3">
+            <a:schemeClr val="accent1"/>
+          </a:fillRef>
+          <a:effectRef idx="2">
+            <a:schemeClr val="accent1"/>
+          </a:effectRef>
+          <a:fontRef idx="minor">
+            <a:schemeClr val="lt1"/>
+          </a:fontRef>
+        </p:style>
+        <p:txBody>
+          <a:bodyPr rtlCol="0" anchor="ctr"/>
+          <a:lstStyle/>
+          <a:p>
+            <a:pPr algn="ctr"/>
+          </a:p>
+        </p:txBody>
+      </p:sp>
+      <p:sp>
+        <p:nvSpPr>
+          <p:cNvPr id="13" name="TextBox 12"/>
+          <p:cNvSpPr txBox="1"/>
+          <p:nvPr/>
+        </p:nvSpPr>
+        <p:spPr>
+          <a:xfrm>
+            <a:off x="8290560" y="2468880"/>
+            <a:ext cx="914400" cy="914400"/>
+          </a:xfrm>
+          <a:prstGeom prst="rect">
+            <a:avLst/>
+          </a:prstGeom>
+          <a:noFill/>
+        </p:spPr>
+        <p:txBody>
+          <a:bodyPr wrap="none" anchor="ctr">
+            <a:spAutoFit/>
+          </a:bodyPr>
+          <a:lstStyle/>
+          <a:p>
+            <a:pPr algn="ctr">
+              <a:defRPr sz="3600" b="1">
+                <a:solidFill>
+                  <a:srgbClr val="0B0F1A"/>
+                </a:solidFill>
+              </a:defRPr>
+            </a:pPr>
+            <a:r>
+              <a:t>⚡</a:t>
+            </a:r>
+          </a:p>
+        </p:txBody>
+      </p:sp>
+      <p:sp>
+        <p:nvSpPr>
+          <p:cNvPr id="14" name="TextBox 13"/>
+          <p:cNvSpPr txBox="1"/>
+          <p:nvPr/>
+        </p:nvSpPr>
+        <p:spPr>
+          <a:xfrm>
+            <a:off x="7696200" y="3657600"/>
+            <a:ext cx="2103120" cy="1371600"/>
+          </a:xfrm>
+          <a:prstGeom prst="rect">
+            <a:avLst/>
+          </a:prstGeom>
+          <a:noFill/>
+        </p:spPr>
+        <p:txBody>
+          <a:bodyPr wrap="square">
+            <a:normAutofit/>
+          </a:bodyPr>
+          <a:lstStyle/>
+          <a:p>
+            <a:pPr algn="ctr">
+              <a:defRPr sz="2000" b="1">
+                <a:solidFill>
+                  <a:srgbClr val="FFFFFF"/>
+                </a:solidFill>
+              </a:defRPr>
+            </a:pPr>
           </a:p>
         </p:txBody>
       </p:sp>
@@ -17065,8 +17592,8 @@
         </p:nvSpPr>
         <p:spPr>
           <a:xfrm>
-            <a:off x="457200" y="731520"/>
-            <a:ext cx="11277295" cy="914400"/>
+            <a:off x="731520" y="2286000"/>
+            <a:ext cx="10728655" cy="1371600"/>
           </a:xfrm>
           <a:prstGeom prst="rect">
             <a:avLst/>
@@ -17074,122 +17601,34 @@
           <a:noFill/>
         </p:spPr>
         <p:txBody>
-          <a:bodyPr wrap="none">
+          <a:bodyPr wrap="square">
             <a:spAutoFit/>
           </a:bodyPr>
           <a:lstStyle/>
           <a:p>
             <a:pPr algn="ctr">
-              <a:defRPr sz="4000" b="1">
+              <a:defRPr sz="5200" b="1">
                 <a:solidFill>
                   <a:srgbClr val="FFFFFF"/>
                 </a:solidFill>
               </a:defRPr>
             </a:pPr>
             <a:r>
-              <a:t>Creating a Project</a:t>
-            </a:r>
-          </a:p>
-        </p:txBody>
-      </p:sp>
-      <p:sp>
-        <p:nvSpPr>
-          <p:cNvPr id="3" name="Rectangle 2"/>
-          <p:cNvSpPr/>
-          <p:nvPr/>
-        </p:nvSpPr>
-        <p:spPr>
-          <a:xfrm>
-            <a:off x="1280160" y="3273552"/>
-            <a:ext cx="8635745" cy="36576"/>
-          </a:xfrm>
-          <a:prstGeom prst="rect">
-            <a:avLst/>
-          </a:prstGeom>
-          <a:solidFill>
-            <a:srgbClr val="2D3A4A"/>
-          </a:solidFill>
-          <a:ln>
-            <a:noFill/>
-          </a:ln>
-        </p:spPr>
-        <p:style>
-          <a:lnRef idx="1">
-            <a:schemeClr val="accent1"/>
-          </a:lnRef>
-          <a:fillRef idx="3">
-            <a:schemeClr val="accent1"/>
-          </a:fillRef>
-          <a:effectRef idx="2">
-            <a:schemeClr val="accent1"/>
-          </a:effectRef>
-          <a:fontRef idx="minor">
-            <a:schemeClr val="lt1"/>
-          </a:fontRef>
-        </p:style>
-        <p:txBody>
-          <a:bodyPr rtlCol="0" anchor="ctr"/>
-          <a:lstStyle/>
-          <a:p>
-            <a:pPr algn="ctr"/>
-            <a:endParaRPr/>
-          </a:p>
-        </p:txBody>
-      </p:sp>
-      <p:sp>
-        <p:nvSpPr>
-          <p:cNvPr id="4" name="Oval 3"/>
-          <p:cNvSpPr/>
-          <p:nvPr/>
-        </p:nvSpPr>
-        <p:spPr>
-          <a:xfrm>
-            <a:off x="914400" y="2926080"/>
-            <a:ext cx="731520" cy="731520"/>
-          </a:xfrm>
-          <a:prstGeom prst="ellipse">
-            <a:avLst/>
-          </a:prstGeom>
-          <a:solidFill>
-            <a:srgbClr val="00D4AA"/>
-          </a:solidFill>
-          <a:ln>
-            <a:noFill/>
-          </a:ln>
-        </p:spPr>
-        <p:style>
-          <a:lnRef idx="1">
-            <a:schemeClr val="accent1"/>
-          </a:lnRef>
-          <a:fillRef idx="3">
-            <a:schemeClr val="accent1"/>
-          </a:fillRef>
-          <a:effectRef idx="2">
-            <a:schemeClr val="accent1"/>
-          </a:effectRef>
-          <a:fontRef idx="minor">
-            <a:schemeClr val="lt1"/>
-          </a:fontRef>
-        </p:style>
-        <p:txBody>
-          <a:bodyPr rtlCol="0" anchor="ctr"/>
-          <a:lstStyle/>
-          <a:p>
-            <a:pPr algn="ctr"/>
-            <a:endParaRPr/>
-          </a:p>
-        </p:txBody>
-      </p:sp>
-      <p:sp>
-        <p:nvSpPr>
-          <p:cNvPr id="5" name="TextBox 4"/>
+              <a:t>What are Projects?</a:t>
+            </a:r>
+          </a:p>
+        </p:txBody>
+      </p:sp>
+      <p:sp>
+        <p:nvSpPr>
+          <p:cNvPr id="3" name="TextBox 2"/>
           <p:cNvSpPr txBox="1"/>
           <p:nvPr/>
         </p:nvSpPr>
         <p:spPr>
           <a:xfrm>
-            <a:off x="914400" y="2926080"/>
-            <a:ext cx="731520" cy="731520"/>
+            <a:off x="914400" y="3840480"/>
+            <a:ext cx="10362895" cy="914400"/>
           </a:xfrm>
           <a:prstGeom prst="rect">
             <a:avLst/>
@@ -17197,625 +17636,20 @@
           <a:noFill/>
         </p:spPr>
         <p:txBody>
-          <a:bodyPr wrap="none" anchor="ctr">
+          <a:bodyPr wrap="square">
             <a:spAutoFit/>
           </a:bodyPr>
           <a:lstStyle/>
           <a:p>
             <a:pPr algn="ctr">
-              <a:defRPr sz="2800" b="1">
-                <a:solidFill>
-                  <a:srgbClr val="0B0F1A"/>
-                </a:solidFill>
-              </a:defRPr>
-            </a:pPr>
-            <a:r>
-              <a:t>1</a:t>
-            </a:r>
-          </a:p>
-        </p:txBody>
-      </p:sp>
-      <p:sp>
-        <p:nvSpPr>
-          <p:cNvPr id="6" name="TextBox 5"/>
-          <p:cNvSpPr txBox="1"/>
-          <p:nvPr/>
-        </p:nvSpPr>
-        <p:spPr>
-          <a:xfrm>
-            <a:off x="457200" y="3840480"/>
-            <a:ext cx="1645920" cy="1371600"/>
-          </a:xfrm>
-          <a:prstGeom prst="rect">
-            <a:avLst/>
-          </a:prstGeom>
-          <a:noFill/>
-        </p:spPr>
-        <p:txBody>
-          <a:bodyPr wrap="square">
-            <a:normAutofit/>
-          </a:bodyPr>
-          <a:lstStyle/>
-          <a:p>
-            <a:pPr algn="ctr">
-              <a:defRPr sz="1800" b="1">
-                <a:solidFill>
-                  <a:srgbClr val="FFFFFF"/>
-                </a:solidFill>
-              </a:defRPr>
-            </a:pPr>
-            <a:r>
-              <a:t>Click 'Projects' in sidebar</a:t>
-            </a:r>
-          </a:p>
-        </p:txBody>
-      </p:sp>
-      <p:sp>
-        <p:nvSpPr>
-          <p:cNvPr id="7" name="Oval 6"/>
-          <p:cNvSpPr/>
-          <p:nvPr/>
-        </p:nvSpPr>
-        <p:spPr>
-          <a:xfrm>
-            <a:off x="2641549" y="2926080"/>
-            <a:ext cx="731520" cy="731520"/>
-          </a:xfrm>
-          <a:prstGeom prst="ellipse">
-            <a:avLst/>
-          </a:prstGeom>
-          <a:solidFill>
-            <a:srgbClr val="00D4AA"/>
-          </a:solidFill>
-          <a:ln>
-            <a:noFill/>
-          </a:ln>
-        </p:spPr>
-        <p:style>
-          <a:lnRef idx="1">
-            <a:schemeClr val="accent1"/>
-          </a:lnRef>
-          <a:fillRef idx="3">
-            <a:schemeClr val="accent1"/>
-          </a:fillRef>
-          <a:effectRef idx="2">
-            <a:schemeClr val="accent1"/>
-          </a:effectRef>
-          <a:fontRef idx="minor">
-            <a:schemeClr val="lt1"/>
-          </a:fontRef>
-        </p:style>
-        <p:txBody>
-          <a:bodyPr rtlCol="0" anchor="ctr"/>
-          <a:lstStyle/>
-          <a:p>
-            <a:pPr algn="ctr"/>
-            <a:endParaRPr/>
-          </a:p>
-        </p:txBody>
-      </p:sp>
-      <p:sp>
-        <p:nvSpPr>
-          <p:cNvPr id="8" name="TextBox 7"/>
-          <p:cNvSpPr txBox="1"/>
-          <p:nvPr/>
-        </p:nvSpPr>
-        <p:spPr>
-          <a:xfrm>
-            <a:off x="2641549" y="2926080"/>
-            <a:ext cx="731520" cy="731520"/>
-          </a:xfrm>
-          <a:prstGeom prst="rect">
-            <a:avLst/>
-          </a:prstGeom>
-          <a:noFill/>
-        </p:spPr>
-        <p:txBody>
-          <a:bodyPr wrap="none" anchor="ctr">
-            <a:spAutoFit/>
-          </a:bodyPr>
-          <a:lstStyle/>
-          <a:p>
-            <a:pPr algn="ctr">
-              <a:defRPr sz="2800" b="1">
-                <a:solidFill>
-                  <a:srgbClr val="0B0F1A"/>
-                </a:solidFill>
-              </a:defRPr>
-            </a:pPr>
-            <a:r>
-              <a:t>2</a:t>
-            </a:r>
-          </a:p>
-        </p:txBody>
-      </p:sp>
-      <p:sp>
-        <p:nvSpPr>
-          <p:cNvPr id="9" name="TextBox 8"/>
-          <p:cNvSpPr txBox="1"/>
-          <p:nvPr/>
-        </p:nvSpPr>
-        <p:spPr>
-          <a:xfrm>
-            <a:off x="2184349" y="3840480"/>
-            <a:ext cx="1645920" cy="1371600"/>
-          </a:xfrm>
-          <a:prstGeom prst="rect">
-            <a:avLst/>
-          </a:prstGeom>
-          <a:noFill/>
-        </p:spPr>
-        <p:txBody>
-          <a:bodyPr wrap="square">
-            <a:normAutofit/>
-          </a:bodyPr>
-          <a:lstStyle/>
-          <a:p>
-            <a:pPr algn="ctr">
-              <a:defRPr sz="1800" b="1">
-                <a:solidFill>
-                  <a:srgbClr val="FFFFFF"/>
-                </a:solidFill>
-              </a:defRPr>
-            </a:pPr>
-            <a:r>
-              <a:t>Click '+ New Project'</a:t>
-            </a:r>
-          </a:p>
-        </p:txBody>
-      </p:sp>
-      <p:sp>
-        <p:nvSpPr>
-          <p:cNvPr id="10" name="Oval 9"/>
-          <p:cNvSpPr/>
-          <p:nvPr/>
-        </p:nvSpPr>
-        <p:spPr>
-          <a:xfrm>
-            <a:off x="4368698" y="2926080"/>
-            <a:ext cx="731520" cy="731520"/>
-          </a:xfrm>
-          <a:prstGeom prst="ellipse">
-            <a:avLst/>
-          </a:prstGeom>
-          <a:solidFill>
-            <a:srgbClr val="00D4AA"/>
-          </a:solidFill>
-          <a:ln>
-            <a:noFill/>
-          </a:ln>
-        </p:spPr>
-        <p:style>
-          <a:lnRef idx="1">
-            <a:schemeClr val="accent1"/>
-          </a:lnRef>
-          <a:fillRef idx="3">
-            <a:schemeClr val="accent1"/>
-          </a:fillRef>
-          <a:effectRef idx="2">
-            <a:schemeClr val="accent1"/>
-          </a:effectRef>
-          <a:fontRef idx="minor">
-            <a:schemeClr val="lt1"/>
-          </a:fontRef>
-        </p:style>
-        <p:txBody>
-          <a:bodyPr rtlCol="0" anchor="ctr"/>
-          <a:lstStyle/>
-          <a:p>
-            <a:pPr algn="ctr"/>
-            <a:endParaRPr/>
-          </a:p>
-        </p:txBody>
-      </p:sp>
-      <p:sp>
-        <p:nvSpPr>
-          <p:cNvPr id="11" name="TextBox 10"/>
-          <p:cNvSpPr txBox="1"/>
-          <p:nvPr/>
-        </p:nvSpPr>
-        <p:spPr>
-          <a:xfrm>
-            <a:off x="4368698" y="2926080"/>
-            <a:ext cx="731520" cy="731520"/>
-          </a:xfrm>
-          <a:prstGeom prst="rect">
-            <a:avLst/>
-          </a:prstGeom>
-          <a:noFill/>
-        </p:spPr>
-        <p:txBody>
-          <a:bodyPr wrap="none" anchor="ctr">
-            <a:spAutoFit/>
-          </a:bodyPr>
-          <a:lstStyle/>
-          <a:p>
-            <a:pPr algn="ctr">
-              <a:defRPr sz="2800" b="1">
-                <a:solidFill>
-                  <a:srgbClr val="0B0F1A"/>
-                </a:solidFill>
-              </a:defRPr>
-            </a:pPr>
-            <a:r>
-              <a:t>3</a:t>
-            </a:r>
-          </a:p>
-        </p:txBody>
-      </p:sp>
-      <p:sp>
-        <p:nvSpPr>
-          <p:cNvPr id="12" name="TextBox 11"/>
-          <p:cNvSpPr txBox="1"/>
-          <p:nvPr/>
-        </p:nvSpPr>
-        <p:spPr>
-          <a:xfrm>
-            <a:off x="3911498" y="3840480"/>
-            <a:ext cx="1645920" cy="1371600"/>
-          </a:xfrm>
-          <a:prstGeom prst="rect">
-            <a:avLst/>
-          </a:prstGeom>
-          <a:noFill/>
-        </p:spPr>
-        <p:txBody>
-          <a:bodyPr wrap="square">
-            <a:normAutofit/>
-          </a:bodyPr>
-          <a:lstStyle/>
-          <a:p>
-            <a:pPr algn="ctr">
-              <a:defRPr sz="1800" b="1">
-                <a:solidFill>
-                  <a:srgbClr val="FFFFFF"/>
-                </a:solidFill>
-              </a:defRPr>
-            </a:pPr>
-            <a:r>
-              <a:t>Name your project</a:t>
-            </a:r>
-          </a:p>
-        </p:txBody>
-      </p:sp>
-      <p:sp>
-        <p:nvSpPr>
-          <p:cNvPr id="13" name="Oval 12"/>
-          <p:cNvSpPr/>
-          <p:nvPr/>
-        </p:nvSpPr>
-        <p:spPr>
-          <a:xfrm>
-            <a:off x="6095847" y="2926080"/>
-            <a:ext cx="731520" cy="731520"/>
-          </a:xfrm>
-          <a:prstGeom prst="ellipse">
-            <a:avLst/>
-          </a:prstGeom>
-          <a:solidFill>
-            <a:srgbClr val="00D4AA"/>
-          </a:solidFill>
-          <a:ln>
-            <a:noFill/>
-          </a:ln>
-        </p:spPr>
-        <p:style>
-          <a:lnRef idx="1">
-            <a:schemeClr val="accent1"/>
-          </a:lnRef>
-          <a:fillRef idx="3">
-            <a:schemeClr val="accent1"/>
-          </a:fillRef>
-          <a:effectRef idx="2">
-            <a:schemeClr val="accent1"/>
-          </a:effectRef>
-          <a:fontRef idx="minor">
-            <a:schemeClr val="lt1"/>
-          </a:fontRef>
-        </p:style>
-        <p:txBody>
-          <a:bodyPr rtlCol="0" anchor="ctr"/>
-          <a:lstStyle/>
-          <a:p>
-            <a:pPr algn="ctr"/>
-            <a:endParaRPr/>
-          </a:p>
-        </p:txBody>
-      </p:sp>
-      <p:sp>
-        <p:nvSpPr>
-          <p:cNvPr id="14" name="TextBox 13"/>
-          <p:cNvSpPr txBox="1"/>
-          <p:nvPr/>
-        </p:nvSpPr>
-        <p:spPr>
-          <a:xfrm>
-            <a:off x="6095847" y="2926080"/>
-            <a:ext cx="731520" cy="731520"/>
-          </a:xfrm>
-          <a:prstGeom prst="rect">
-            <a:avLst/>
-          </a:prstGeom>
-          <a:noFill/>
-        </p:spPr>
-        <p:txBody>
-          <a:bodyPr wrap="none" anchor="ctr">
-            <a:spAutoFit/>
-          </a:bodyPr>
-          <a:lstStyle/>
-          <a:p>
-            <a:pPr algn="ctr">
-              <a:defRPr sz="2800" b="1">
-                <a:solidFill>
-                  <a:srgbClr val="0B0F1A"/>
-                </a:solidFill>
-              </a:defRPr>
-            </a:pPr>
-            <a:r>
-              <a:t>4</a:t>
-            </a:r>
-          </a:p>
-        </p:txBody>
-      </p:sp>
-      <p:sp>
-        <p:nvSpPr>
-          <p:cNvPr id="15" name="TextBox 14"/>
-          <p:cNvSpPr txBox="1"/>
-          <p:nvPr/>
-        </p:nvSpPr>
-        <p:spPr>
-          <a:xfrm>
-            <a:off x="5638647" y="3840480"/>
-            <a:ext cx="1645920" cy="1371600"/>
-          </a:xfrm>
-          <a:prstGeom prst="rect">
-            <a:avLst/>
-          </a:prstGeom>
-          <a:noFill/>
-        </p:spPr>
-        <p:txBody>
-          <a:bodyPr wrap="square">
-            <a:normAutofit/>
-          </a:bodyPr>
-          <a:lstStyle/>
-          <a:p>
-            <a:pPr algn="ctr">
-              <a:defRPr sz="1800" b="1">
-                <a:solidFill>
-                  <a:srgbClr val="FFFFFF"/>
-                </a:solidFill>
-              </a:defRPr>
-            </a:pPr>
-            <a:r>
-              <a:t>Add custom instructions</a:t>
-            </a:r>
-          </a:p>
-        </p:txBody>
-      </p:sp>
-      <p:sp>
-        <p:nvSpPr>
-          <p:cNvPr id="16" name="Oval 15"/>
-          <p:cNvSpPr/>
-          <p:nvPr/>
-        </p:nvSpPr>
-        <p:spPr>
-          <a:xfrm>
-            <a:off x="7822996" y="2926080"/>
-            <a:ext cx="731520" cy="731520"/>
-          </a:xfrm>
-          <a:prstGeom prst="ellipse">
-            <a:avLst/>
-          </a:prstGeom>
-          <a:solidFill>
-            <a:srgbClr val="00D4AA"/>
-          </a:solidFill>
-          <a:ln>
-            <a:noFill/>
-          </a:ln>
-        </p:spPr>
-        <p:style>
-          <a:lnRef idx="1">
-            <a:schemeClr val="accent1"/>
-          </a:lnRef>
-          <a:fillRef idx="3">
-            <a:schemeClr val="accent1"/>
-          </a:fillRef>
-          <a:effectRef idx="2">
-            <a:schemeClr val="accent1"/>
-          </a:effectRef>
-          <a:fontRef idx="minor">
-            <a:schemeClr val="lt1"/>
-          </a:fontRef>
-        </p:style>
-        <p:txBody>
-          <a:bodyPr rtlCol="0" anchor="ctr"/>
-          <a:lstStyle/>
-          <a:p>
-            <a:pPr algn="ctr"/>
-            <a:endParaRPr/>
-          </a:p>
-        </p:txBody>
-      </p:sp>
-      <p:sp>
-        <p:nvSpPr>
-          <p:cNvPr id="17" name="TextBox 16"/>
-          <p:cNvSpPr txBox="1"/>
-          <p:nvPr/>
-        </p:nvSpPr>
-        <p:spPr>
-          <a:xfrm>
-            <a:off x="7822996" y="2926080"/>
-            <a:ext cx="731520" cy="731520"/>
-          </a:xfrm>
-          <a:prstGeom prst="rect">
-            <a:avLst/>
-          </a:prstGeom>
-          <a:noFill/>
-        </p:spPr>
-        <p:txBody>
-          <a:bodyPr wrap="none" anchor="ctr">
-            <a:spAutoFit/>
-          </a:bodyPr>
-          <a:lstStyle/>
-          <a:p>
-            <a:pPr algn="ctr">
-              <a:defRPr sz="2800" b="1">
-                <a:solidFill>
-                  <a:srgbClr val="0B0F1A"/>
-                </a:solidFill>
-              </a:defRPr>
-            </a:pPr>
-            <a:r>
-              <a:t>5</a:t>
-            </a:r>
-          </a:p>
-        </p:txBody>
-      </p:sp>
-      <p:sp>
-        <p:nvSpPr>
-          <p:cNvPr id="18" name="TextBox 17"/>
-          <p:cNvSpPr txBox="1"/>
-          <p:nvPr/>
-        </p:nvSpPr>
-        <p:spPr>
-          <a:xfrm>
-            <a:off x="7365796" y="3840480"/>
-            <a:ext cx="1645920" cy="1371600"/>
-          </a:xfrm>
-          <a:prstGeom prst="rect">
-            <a:avLst/>
-          </a:prstGeom>
-          <a:noFill/>
-        </p:spPr>
-        <p:txBody>
-          <a:bodyPr wrap="square">
-            <a:normAutofit/>
-          </a:bodyPr>
-          <a:lstStyle/>
-          <a:p>
-            <a:pPr algn="ctr">
-              <a:defRPr sz="1800" b="1">
-                <a:solidFill>
-                  <a:srgbClr val="FFFFFF"/>
-                </a:solidFill>
-              </a:defRPr>
-            </a:pPr>
-            <a:r>
-              <a:t>Upload reference documents</a:t>
-            </a:r>
-          </a:p>
-        </p:txBody>
-      </p:sp>
-      <p:sp>
-        <p:nvSpPr>
-          <p:cNvPr id="19" name="Oval 18"/>
-          <p:cNvSpPr/>
-          <p:nvPr/>
-        </p:nvSpPr>
-        <p:spPr>
-          <a:xfrm>
-            <a:off x="9550145" y="2926080"/>
-            <a:ext cx="731520" cy="731520"/>
-          </a:xfrm>
-          <a:prstGeom prst="ellipse">
-            <a:avLst/>
-          </a:prstGeom>
-          <a:solidFill>
-            <a:srgbClr val="00D4AA"/>
-          </a:solidFill>
-          <a:ln>
-            <a:noFill/>
-          </a:ln>
-        </p:spPr>
-        <p:style>
-          <a:lnRef idx="1">
-            <a:schemeClr val="accent1"/>
-          </a:lnRef>
-          <a:fillRef idx="3">
-            <a:schemeClr val="accent1"/>
-          </a:fillRef>
-          <a:effectRef idx="2">
-            <a:schemeClr val="accent1"/>
-          </a:effectRef>
-          <a:fontRef idx="minor">
-            <a:schemeClr val="lt1"/>
-          </a:fontRef>
-        </p:style>
-        <p:txBody>
-          <a:bodyPr rtlCol="0" anchor="ctr"/>
-          <a:lstStyle/>
-          <a:p>
-            <a:pPr algn="ctr"/>
-            <a:endParaRPr/>
-          </a:p>
-        </p:txBody>
-      </p:sp>
-      <p:sp>
-        <p:nvSpPr>
-          <p:cNvPr id="20" name="TextBox 19"/>
-          <p:cNvSpPr txBox="1"/>
-          <p:nvPr/>
-        </p:nvSpPr>
-        <p:spPr>
-          <a:xfrm>
-            <a:off x="9550145" y="2926080"/>
-            <a:ext cx="731520" cy="731520"/>
-          </a:xfrm>
-          <a:prstGeom prst="rect">
-            <a:avLst/>
-          </a:prstGeom>
-          <a:noFill/>
-        </p:spPr>
-        <p:txBody>
-          <a:bodyPr wrap="none" anchor="ctr">
-            <a:spAutoFit/>
-          </a:bodyPr>
-          <a:lstStyle/>
-          <a:p>
-            <a:pPr algn="ctr">
-              <a:defRPr sz="2800" b="1">
-                <a:solidFill>
-                  <a:srgbClr val="0B0F1A"/>
-                </a:solidFill>
-              </a:defRPr>
-            </a:pPr>
-            <a:r>
-              <a:t>6</a:t>
-            </a:r>
-          </a:p>
-        </p:txBody>
-      </p:sp>
-      <p:sp>
-        <p:nvSpPr>
-          <p:cNvPr id="21" name="TextBox 20"/>
-          <p:cNvSpPr txBox="1"/>
-          <p:nvPr/>
-        </p:nvSpPr>
-        <p:spPr>
-          <a:xfrm>
-            <a:off x="9092945" y="3840480"/>
-            <a:ext cx="1645920" cy="1371600"/>
-          </a:xfrm>
-          <a:prstGeom prst="rect">
-            <a:avLst/>
-          </a:prstGeom>
-          <a:noFill/>
-        </p:spPr>
-        <p:txBody>
-          <a:bodyPr wrap="square">
-            <a:normAutofit/>
-          </a:bodyPr>
-          <a:lstStyle/>
-          <a:p>
-            <a:pPr algn="ctr">
-              <a:defRPr sz="1800" b="1">
-                <a:solidFill>
-                  <a:srgbClr val="FFFFFF"/>
-                </a:solidFill>
-              </a:defRPr>
-            </a:pPr>
-            <a:r>
-              <a:t>Start chatting</a:t>
+              <a:defRPr sz="2400">
+                <a:solidFill>
+                  <a:srgbClr val="8B95A5"/>
+                </a:solidFill>
+              </a:defRPr>
+            </a:pPr>
+            <a:r>
+              <a:t>Scoped knowledge bases for specific workstreams</a:t>
             </a:r>
           </a:p>
         </p:txBody>
@@ -17829,7 +17663,7 @@
 </file>
 
 <file path=ppt/slides/slide21.xml><?xml version="1.0" encoding="utf-8"?>
-<p:sld xmlns:a="http://schemas.openxmlformats.org/drawingml/2006/main" xmlns:p="http://schemas.openxmlformats.org/presentationml/2006/main" xmlns:r="http://schemas.openxmlformats.org/officeDocument/2006/relationships">
+<p:sld xmlns:a="http://schemas.openxmlformats.org/drawingml/2006/main" xmlns:r="http://schemas.openxmlformats.org/officeDocument/2006/relationships" xmlns:p="http://schemas.openxmlformats.org/presentationml/2006/main">
   <p:cSld>
     <p:bg>
       <p:bgPr>
@@ -17845,7 +17679,14 @@
         <p:cNvGrpSpPr/>
         <p:nvPr/>
       </p:nvGrpSpPr>
-      <p:grpSpPr/>
+      <p:grpSpPr>
+        <a:xfrm>
+          <a:off x="0" y="0"/>
+          <a:ext cx="0" cy="0"/>
+          <a:chOff x="0" y="0"/>
+          <a:chExt cx="0" cy="0"/>
+        </a:xfrm>
+      </p:grpSpPr>
       <p:sp>
         <p:nvSpPr>
           <p:cNvPr id="2" name="TextBox 1"/>
@@ -17855,7 +17696,7 @@
         <p:spPr>
           <a:xfrm>
             <a:off x="457200" y="731520"/>
-            <a:ext cx="11277600" cy="914400"/>
+            <a:ext cx="11277295" cy="914400"/>
           </a:xfrm>
           <a:prstGeom prst="rect">
             <a:avLst/>
@@ -17876,32 +17717,30 @@
               </a:defRPr>
             </a:pPr>
             <a:r>
-              <a:t>Settings Deep Dive</a:t>
-            </a:r>
-          </a:p>
-        </p:txBody>
-      </p:sp>
-      <p:sp>
-        <p:nvSpPr>
-          <p:cNvPr id="3" name="Rounded Rectangle 2"/>
+              <a:t>Creating a Project</a:t>
+            </a:r>
+          </a:p>
+        </p:txBody>
+      </p:sp>
+      <p:sp>
+        <p:nvSpPr>
+          <p:cNvPr id="3" name="Rectangle 2"/>
           <p:cNvSpPr/>
           <p:nvPr/>
         </p:nvSpPr>
         <p:spPr>
           <a:xfrm>
-            <a:off x="2301240" y="2011680"/>
-            <a:ext cx="2286000" cy="3200400"/>
-          </a:xfrm>
-          <a:prstGeom prst="roundRect">
+            <a:off x="1280160" y="3273552"/>
+            <a:ext cx="8635745" cy="36576"/>
+          </a:xfrm>
+          <a:prstGeom prst="rect">
             <a:avLst/>
           </a:prstGeom>
           <a:solidFill>
-            <a:srgbClr val="141A26"/>
+            <a:srgbClr val="2D3A4A"/>
           </a:solidFill>
-          <a:ln w="25400">
-            <a:solidFill>
-              <a:srgbClr val="00D4AA"/>
-            </a:solidFill>
+          <a:ln>
+            <a:noFill/>
           </a:ln>
         </p:spPr>
         <p:style>
@@ -17923,6 +17762,7 @@
           <a:lstStyle/>
           <a:p>
             <a:pPr algn="ctr"/>
+            <a:endParaRPr/>
           </a:p>
         </p:txBody>
       </p:sp>
@@ -17934,8 +17774,8 @@
         </p:nvSpPr>
         <p:spPr>
           <a:xfrm>
-            <a:off x="2987040" y="2468880"/>
-            <a:ext cx="914400" cy="914400"/>
+            <a:off x="914400" y="2926080"/>
+            <a:ext cx="731520" cy="731520"/>
           </a:xfrm>
           <a:prstGeom prst="ellipse">
             <a:avLst/>
@@ -17966,6 +17806,7 @@
           <a:lstStyle/>
           <a:p>
             <a:pPr algn="ctr"/>
+            <a:endParaRPr/>
           </a:p>
         </p:txBody>
       </p:sp>
@@ -17977,8 +17818,8 @@
         </p:nvSpPr>
         <p:spPr>
           <a:xfrm>
-            <a:off x="2987040" y="2468880"/>
-            <a:ext cx="914400" cy="914400"/>
+            <a:off x="914400" y="2926080"/>
+            <a:ext cx="731520" cy="731520"/>
           </a:xfrm>
           <a:prstGeom prst="rect">
             <a:avLst/>
@@ -17992,14 +17833,14 @@
           <a:lstStyle/>
           <a:p>
             <a:pPr algn="ctr">
-              <a:defRPr sz="3600" b="1">
+              <a:defRPr sz="2800" b="1">
                 <a:solidFill>
                   <a:srgbClr val="0B0F1A"/>
                 </a:solidFill>
               </a:defRPr>
             </a:pPr>
             <a:r>
-              <a:t>👤</a:t>
+              <a:t>1</a:t>
             </a:r>
           </a:p>
         </p:txBody>
@@ -18012,8 +17853,8 @@
         </p:nvSpPr>
         <p:spPr>
           <a:xfrm>
-            <a:off x="2392680" y="3657600"/>
-            <a:ext cx="2103120" cy="1371600"/>
+            <a:off x="457200" y="3840480"/>
+            <a:ext cx="1645920" cy="1371600"/>
           </a:xfrm>
           <a:prstGeom prst="rect">
             <a:avLst/>
@@ -18027,36 +17868,37 @@
           <a:lstStyle/>
           <a:p>
             <a:pPr algn="ctr">
-              <a:defRPr sz="2000" b="1">
+              <a:defRPr sz="1800" b="1">
                 <a:solidFill>
                   <a:srgbClr val="FFFFFF"/>
                 </a:solidFill>
               </a:defRPr>
             </a:pPr>
-          </a:p>
-        </p:txBody>
-      </p:sp>
-      <p:sp>
-        <p:nvSpPr>
-          <p:cNvPr id="7" name="Rounded Rectangle 6"/>
+            <a:r>
+              <a:t>Click 'Projects' in sidebar</a:t>
+            </a:r>
+          </a:p>
+        </p:txBody>
+      </p:sp>
+      <p:sp>
+        <p:nvSpPr>
+          <p:cNvPr id="7" name="Oval 6"/>
           <p:cNvSpPr/>
           <p:nvPr/>
         </p:nvSpPr>
         <p:spPr>
           <a:xfrm>
-            <a:off x="4953000" y="2011680"/>
-            <a:ext cx="2286000" cy="3200400"/>
-          </a:xfrm>
-          <a:prstGeom prst="roundRect">
+            <a:off x="2641549" y="2926080"/>
+            <a:ext cx="731520" cy="731520"/>
+          </a:xfrm>
+          <a:prstGeom prst="ellipse">
             <a:avLst/>
           </a:prstGeom>
           <a:solidFill>
-            <a:srgbClr val="141A26"/>
+            <a:srgbClr val="00D4AA"/>
           </a:solidFill>
-          <a:ln w="25400">
-            <a:solidFill>
-              <a:srgbClr val="E86B4A"/>
-            </a:solidFill>
+          <a:ln>
+            <a:noFill/>
           </a:ln>
         </p:spPr>
         <p:style>
@@ -18078,25 +17920,96 @@
           <a:lstStyle/>
           <a:p>
             <a:pPr algn="ctr"/>
-          </a:p>
-        </p:txBody>
-      </p:sp>
-      <p:sp>
-        <p:nvSpPr>
-          <p:cNvPr id="8" name="Oval 7"/>
+            <a:endParaRPr/>
+          </a:p>
+        </p:txBody>
+      </p:sp>
+      <p:sp>
+        <p:nvSpPr>
+          <p:cNvPr id="8" name="TextBox 7"/>
+          <p:cNvSpPr txBox="1"/>
+          <p:nvPr/>
+        </p:nvSpPr>
+        <p:spPr>
+          <a:xfrm>
+            <a:off x="2641549" y="2926080"/>
+            <a:ext cx="731520" cy="731520"/>
+          </a:xfrm>
+          <a:prstGeom prst="rect">
+            <a:avLst/>
+          </a:prstGeom>
+          <a:noFill/>
+        </p:spPr>
+        <p:txBody>
+          <a:bodyPr wrap="none" anchor="ctr">
+            <a:spAutoFit/>
+          </a:bodyPr>
+          <a:lstStyle/>
+          <a:p>
+            <a:pPr algn="ctr">
+              <a:defRPr sz="2800" b="1">
+                <a:solidFill>
+                  <a:srgbClr val="0B0F1A"/>
+                </a:solidFill>
+              </a:defRPr>
+            </a:pPr>
+            <a:r>
+              <a:t>2</a:t>
+            </a:r>
+          </a:p>
+        </p:txBody>
+      </p:sp>
+      <p:sp>
+        <p:nvSpPr>
+          <p:cNvPr id="9" name="TextBox 8"/>
+          <p:cNvSpPr txBox="1"/>
+          <p:nvPr/>
+        </p:nvSpPr>
+        <p:spPr>
+          <a:xfrm>
+            <a:off x="2184349" y="3840480"/>
+            <a:ext cx="1645920" cy="1371600"/>
+          </a:xfrm>
+          <a:prstGeom prst="rect">
+            <a:avLst/>
+          </a:prstGeom>
+          <a:noFill/>
+        </p:spPr>
+        <p:txBody>
+          <a:bodyPr wrap="square">
+            <a:normAutofit/>
+          </a:bodyPr>
+          <a:lstStyle/>
+          <a:p>
+            <a:pPr algn="ctr">
+              <a:defRPr sz="1800" b="1">
+                <a:solidFill>
+                  <a:srgbClr val="FFFFFF"/>
+                </a:solidFill>
+              </a:defRPr>
+            </a:pPr>
+            <a:r>
+              <a:t>Click '+ New Project'</a:t>
+            </a:r>
+          </a:p>
+        </p:txBody>
+      </p:sp>
+      <p:sp>
+        <p:nvSpPr>
+          <p:cNvPr id="10" name="Oval 9"/>
           <p:cNvSpPr/>
           <p:nvPr/>
         </p:nvSpPr>
         <p:spPr>
           <a:xfrm>
-            <a:off x="5638800" y="2468880"/>
-            <a:ext cx="914400" cy="914400"/>
+            <a:off x="4368698" y="2926080"/>
+            <a:ext cx="731520" cy="731520"/>
           </a:xfrm>
           <a:prstGeom prst="ellipse">
             <a:avLst/>
           </a:prstGeom>
           <a:solidFill>
-            <a:srgbClr val="E86B4A"/>
+            <a:srgbClr val="00D4AA"/>
           </a:solidFill>
           <a:ln>
             <a:noFill/>
@@ -18121,19 +18034,20 @@
           <a:lstStyle/>
           <a:p>
             <a:pPr algn="ctr"/>
-          </a:p>
-        </p:txBody>
-      </p:sp>
-      <p:sp>
-        <p:nvSpPr>
-          <p:cNvPr id="9" name="TextBox 8"/>
+            <a:endParaRPr/>
+          </a:p>
+        </p:txBody>
+      </p:sp>
+      <p:sp>
+        <p:nvSpPr>
+          <p:cNvPr id="11" name="TextBox 10"/>
           <p:cNvSpPr txBox="1"/>
           <p:nvPr/>
         </p:nvSpPr>
         <p:spPr>
           <a:xfrm>
-            <a:off x="5638800" y="2468880"/>
-            <a:ext cx="914400" cy="914400"/>
+            <a:off x="4368698" y="2926080"/>
+            <a:ext cx="731520" cy="731520"/>
           </a:xfrm>
           <a:prstGeom prst="rect">
             <a:avLst/>
@@ -18147,28 +18061,28 @@
           <a:lstStyle/>
           <a:p>
             <a:pPr algn="ctr">
-              <a:defRPr sz="3600" b="1">
+              <a:defRPr sz="2800" b="1">
                 <a:solidFill>
                   <a:srgbClr val="0B0F1A"/>
                 </a:solidFill>
               </a:defRPr>
             </a:pPr>
             <a:r>
-              <a:t>🔒</a:t>
-            </a:r>
-          </a:p>
-        </p:txBody>
-      </p:sp>
-      <p:sp>
-        <p:nvSpPr>
-          <p:cNvPr id="10" name="TextBox 9"/>
+              <a:t>3</a:t>
+            </a:r>
+          </a:p>
+        </p:txBody>
+      </p:sp>
+      <p:sp>
+        <p:nvSpPr>
+          <p:cNvPr id="12" name="TextBox 11"/>
           <p:cNvSpPr txBox="1"/>
           <p:nvPr/>
         </p:nvSpPr>
         <p:spPr>
           <a:xfrm>
-            <a:off x="5044440" y="3657600"/>
-            <a:ext cx="2103120" cy="1371600"/>
+            <a:off x="3911498" y="3840480"/>
+            <a:ext cx="1645920" cy="1371600"/>
           </a:xfrm>
           <a:prstGeom prst="rect">
             <a:avLst/>
@@ -18182,36 +18096,37 @@
           <a:lstStyle/>
           <a:p>
             <a:pPr algn="ctr">
-              <a:defRPr sz="2000" b="1">
+              <a:defRPr sz="1800" b="1">
                 <a:solidFill>
                   <a:srgbClr val="FFFFFF"/>
                 </a:solidFill>
               </a:defRPr>
             </a:pPr>
-          </a:p>
-        </p:txBody>
-      </p:sp>
-      <p:sp>
-        <p:nvSpPr>
-          <p:cNvPr id="11" name="Rounded Rectangle 10"/>
+            <a:r>
+              <a:t>Name your project</a:t>
+            </a:r>
+          </a:p>
+        </p:txBody>
+      </p:sp>
+      <p:sp>
+        <p:nvSpPr>
+          <p:cNvPr id="13" name="Oval 12"/>
           <p:cNvSpPr/>
           <p:nvPr/>
         </p:nvSpPr>
         <p:spPr>
           <a:xfrm>
-            <a:off x="7604760" y="2011680"/>
-            <a:ext cx="2286000" cy="3200400"/>
-          </a:xfrm>
-          <a:prstGeom prst="roundRect">
+            <a:off x="6095847" y="2926080"/>
+            <a:ext cx="731520" cy="731520"/>
+          </a:xfrm>
+          <a:prstGeom prst="ellipse">
             <a:avLst/>
           </a:prstGeom>
           <a:solidFill>
-            <a:srgbClr val="141A26"/>
+            <a:srgbClr val="00D4AA"/>
           </a:solidFill>
-          <a:ln w="25400">
-            <a:solidFill>
-              <a:srgbClr val="10B981"/>
-            </a:solidFill>
+          <a:ln>
+            <a:noFill/>
           </a:ln>
         </p:spPr>
         <p:style>
@@ -18233,25 +18148,96 @@
           <a:lstStyle/>
           <a:p>
             <a:pPr algn="ctr"/>
-          </a:p>
-        </p:txBody>
-      </p:sp>
-      <p:sp>
-        <p:nvSpPr>
-          <p:cNvPr id="12" name="Oval 11"/>
+            <a:endParaRPr/>
+          </a:p>
+        </p:txBody>
+      </p:sp>
+      <p:sp>
+        <p:nvSpPr>
+          <p:cNvPr id="14" name="TextBox 13"/>
+          <p:cNvSpPr txBox="1"/>
+          <p:nvPr/>
+        </p:nvSpPr>
+        <p:spPr>
+          <a:xfrm>
+            <a:off x="6095847" y="2926080"/>
+            <a:ext cx="731520" cy="731520"/>
+          </a:xfrm>
+          <a:prstGeom prst="rect">
+            <a:avLst/>
+          </a:prstGeom>
+          <a:noFill/>
+        </p:spPr>
+        <p:txBody>
+          <a:bodyPr wrap="none" anchor="ctr">
+            <a:spAutoFit/>
+          </a:bodyPr>
+          <a:lstStyle/>
+          <a:p>
+            <a:pPr algn="ctr">
+              <a:defRPr sz="2800" b="1">
+                <a:solidFill>
+                  <a:srgbClr val="0B0F1A"/>
+                </a:solidFill>
+              </a:defRPr>
+            </a:pPr>
+            <a:r>
+              <a:t>4</a:t>
+            </a:r>
+          </a:p>
+        </p:txBody>
+      </p:sp>
+      <p:sp>
+        <p:nvSpPr>
+          <p:cNvPr id="15" name="TextBox 14"/>
+          <p:cNvSpPr txBox="1"/>
+          <p:nvPr/>
+        </p:nvSpPr>
+        <p:spPr>
+          <a:xfrm>
+            <a:off x="5638647" y="3840480"/>
+            <a:ext cx="1645920" cy="1371600"/>
+          </a:xfrm>
+          <a:prstGeom prst="rect">
+            <a:avLst/>
+          </a:prstGeom>
+          <a:noFill/>
+        </p:spPr>
+        <p:txBody>
+          <a:bodyPr wrap="square">
+            <a:normAutofit/>
+          </a:bodyPr>
+          <a:lstStyle/>
+          <a:p>
+            <a:pPr algn="ctr">
+              <a:defRPr sz="1800" b="1">
+                <a:solidFill>
+                  <a:srgbClr val="FFFFFF"/>
+                </a:solidFill>
+              </a:defRPr>
+            </a:pPr>
+            <a:r>
+              <a:t>Add custom instructions</a:t>
+            </a:r>
+          </a:p>
+        </p:txBody>
+      </p:sp>
+      <p:sp>
+        <p:nvSpPr>
+          <p:cNvPr id="16" name="Oval 15"/>
           <p:cNvSpPr/>
           <p:nvPr/>
         </p:nvSpPr>
         <p:spPr>
           <a:xfrm>
-            <a:off x="8290560" y="2468880"/>
-            <a:ext cx="914400" cy="914400"/>
+            <a:off x="7822996" y="2926080"/>
+            <a:ext cx="731520" cy="731520"/>
           </a:xfrm>
           <a:prstGeom prst="ellipse">
             <a:avLst/>
           </a:prstGeom>
           <a:solidFill>
-            <a:srgbClr val="10B981"/>
+            <a:srgbClr val="00D4AA"/>
           </a:solidFill>
           <a:ln>
             <a:noFill/>
@@ -18276,19 +18262,20 @@
           <a:lstStyle/>
           <a:p>
             <a:pPr algn="ctr"/>
-          </a:p>
-        </p:txBody>
-      </p:sp>
-      <p:sp>
-        <p:nvSpPr>
-          <p:cNvPr id="13" name="TextBox 12"/>
+            <a:endParaRPr/>
+          </a:p>
+        </p:txBody>
+      </p:sp>
+      <p:sp>
+        <p:nvSpPr>
+          <p:cNvPr id="17" name="TextBox 16"/>
           <p:cNvSpPr txBox="1"/>
           <p:nvPr/>
         </p:nvSpPr>
         <p:spPr>
           <a:xfrm>
-            <a:off x="8290560" y="2468880"/>
-            <a:ext cx="914400" cy="914400"/>
+            <a:off x="7822996" y="2926080"/>
+            <a:ext cx="731520" cy="731520"/>
           </a:xfrm>
           <a:prstGeom prst="rect">
             <a:avLst/>
@@ -18302,28 +18289,28 @@
           <a:lstStyle/>
           <a:p>
             <a:pPr algn="ctr">
-              <a:defRPr sz="3600" b="1">
+              <a:defRPr sz="2800" b="1">
                 <a:solidFill>
                   <a:srgbClr val="0B0F1A"/>
                 </a:solidFill>
               </a:defRPr>
             </a:pPr>
             <a:r>
-              <a:t>⚡</a:t>
-            </a:r>
-          </a:p>
-        </p:txBody>
-      </p:sp>
-      <p:sp>
-        <p:nvSpPr>
-          <p:cNvPr id="14" name="TextBox 13"/>
+              <a:t>5</a:t>
+            </a:r>
+          </a:p>
+        </p:txBody>
+      </p:sp>
+      <p:sp>
+        <p:nvSpPr>
+          <p:cNvPr id="18" name="TextBox 17"/>
           <p:cNvSpPr txBox="1"/>
           <p:nvPr/>
         </p:nvSpPr>
         <p:spPr>
           <a:xfrm>
-            <a:off x="7696200" y="3657600"/>
-            <a:ext cx="2103120" cy="1371600"/>
+            <a:off x="7365796" y="3840480"/>
+            <a:ext cx="1645920" cy="1371600"/>
           </a:xfrm>
           <a:prstGeom prst="rect">
             <a:avLst/>
@@ -18337,12 +18324,129 @@
           <a:lstStyle/>
           <a:p>
             <a:pPr algn="ctr">
-              <a:defRPr sz="2000" b="1">
+              <a:defRPr sz="1800" b="1">
                 <a:solidFill>
                   <a:srgbClr val="FFFFFF"/>
                 </a:solidFill>
               </a:defRPr>
             </a:pPr>
+            <a:r>
+              <a:t>Upload reference documents</a:t>
+            </a:r>
+          </a:p>
+        </p:txBody>
+      </p:sp>
+      <p:sp>
+        <p:nvSpPr>
+          <p:cNvPr id="19" name="Oval 18"/>
+          <p:cNvSpPr/>
+          <p:nvPr/>
+        </p:nvSpPr>
+        <p:spPr>
+          <a:xfrm>
+            <a:off x="9550145" y="2926080"/>
+            <a:ext cx="731520" cy="731520"/>
+          </a:xfrm>
+          <a:prstGeom prst="ellipse">
+            <a:avLst/>
+          </a:prstGeom>
+          <a:solidFill>
+            <a:srgbClr val="00D4AA"/>
+          </a:solidFill>
+          <a:ln>
+            <a:noFill/>
+          </a:ln>
+        </p:spPr>
+        <p:style>
+          <a:lnRef idx="1">
+            <a:schemeClr val="accent1"/>
+          </a:lnRef>
+          <a:fillRef idx="3">
+            <a:schemeClr val="accent1"/>
+          </a:fillRef>
+          <a:effectRef idx="2">
+            <a:schemeClr val="accent1"/>
+          </a:effectRef>
+          <a:fontRef idx="minor">
+            <a:schemeClr val="lt1"/>
+          </a:fontRef>
+        </p:style>
+        <p:txBody>
+          <a:bodyPr rtlCol="0" anchor="ctr"/>
+          <a:lstStyle/>
+          <a:p>
+            <a:pPr algn="ctr"/>
+            <a:endParaRPr/>
+          </a:p>
+        </p:txBody>
+      </p:sp>
+      <p:sp>
+        <p:nvSpPr>
+          <p:cNvPr id="20" name="TextBox 19"/>
+          <p:cNvSpPr txBox="1"/>
+          <p:nvPr/>
+        </p:nvSpPr>
+        <p:spPr>
+          <a:xfrm>
+            <a:off x="9550145" y="2926080"/>
+            <a:ext cx="731520" cy="731520"/>
+          </a:xfrm>
+          <a:prstGeom prst="rect">
+            <a:avLst/>
+          </a:prstGeom>
+          <a:noFill/>
+        </p:spPr>
+        <p:txBody>
+          <a:bodyPr wrap="none" anchor="ctr">
+            <a:spAutoFit/>
+          </a:bodyPr>
+          <a:lstStyle/>
+          <a:p>
+            <a:pPr algn="ctr">
+              <a:defRPr sz="2800" b="1">
+                <a:solidFill>
+                  <a:srgbClr val="0B0F1A"/>
+                </a:solidFill>
+              </a:defRPr>
+            </a:pPr>
+            <a:r>
+              <a:t>6</a:t>
+            </a:r>
+          </a:p>
+        </p:txBody>
+      </p:sp>
+      <p:sp>
+        <p:nvSpPr>
+          <p:cNvPr id="21" name="TextBox 20"/>
+          <p:cNvSpPr txBox="1"/>
+          <p:nvPr/>
+        </p:nvSpPr>
+        <p:spPr>
+          <a:xfrm>
+            <a:off x="9092945" y="3840480"/>
+            <a:ext cx="1645920" cy="1371600"/>
+          </a:xfrm>
+          <a:prstGeom prst="rect">
+            <a:avLst/>
+          </a:prstGeom>
+          <a:noFill/>
+        </p:spPr>
+        <p:txBody>
+          <a:bodyPr wrap="square">
+            <a:normAutofit/>
+          </a:bodyPr>
+          <a:lstStyle/>
+          <a:p>
+            <a:pPr algn="ctr">
+              <a:defRPr sz="1800" b="1">
+                <a:solidFill>
+                  <a:srgbClr val="FFFFFF"/>
+                </a:solidFill>
+              </a:defRPr>
+            </a:pPr>
+            <a:r>
+              <a:t>Start chatting</a:t>
+            </a:r>
           </a:p>
         </p:txBody>
       </p:sp>
@@ -43810,6 +43914,702 @@
             </a:pPr>
             <a:r>
               <a:t>- © 2026 AIA Copilot</a:t>
+            </a:r>
+          </a:p>
+        </p:txBody>
+      </p:sp>
+    </p:spTree>
+  </p:cSld>
+  <p:clrMapOvr>
+    <a:masterClrMapping/>
+  </p:clrMapOvr>
+</p:sld>
+</file>
+
+<file path=ppt/slides/slide83.xml><?xml version="1.0" encoding="utf-8"?>
+<p:sld xmlns:a="http://schemas.openxmlformats.org/drawingml/2006/main" xmlns:p="http://schemas.openxmlformats.org/presentationml/2006/main" xmlns:r="http://schemas.openxmlformats.org/officeDocument/2006/relationships">
+  <p:cSld>
+    <p:bg>
+      <p:bgPr>
+        <a:solidFill>
+          <a:srgbClr val="0B0F1A"/>
+        </a:solidFill>
+        <a:effectLst/>
+      </p:bgPr>
+    </p:bg>
+    <p:spTree>
+      <p:nvGrpSpPr>
+        <p:cNvPr id="1" name=""/>
+        <p:cNvGrpSpPr/>
+        <p:nvPr/>
+      </p:nvGrpSpPr>
+      <p:grpSpPr/>
+      <p:sp>
+        <p:nvSpPr>
+          <p:cNvPr id="2" name="Rectangle 1"/>
+          <p:cNvSpPr/>
+          <p:nvPr/>
+        </p:nvSpPr>
+        <p:spPr>
+          <a:xfrm>
+            <a:off x="457200" y="365760"/>
+            <a:ext cx="1371600" cy="36576"/>
+          </a:xfrm>
+          <a:prstGeom prst="rect">
+            <a:avLst/>
+          </a:prstGeom>
+          <a:solidFill>
+            <a:srgbClr val="14B8A6"/>
+          </a:solidFill>
+          <a:ln>
+            <a:noFill/>
+          </a:ln>
+        </p:spPr>
+        <p:style>
+          <a:lnRef idx="1">
+            <a:schemeClr val="accent1"/>
+          </a:lnRef>
+          <a:fillRef idx="3">
+            <a:schemeClr val="accent1"/>
+          </a:fillRef>
+          <a:effectRef idx="2">
+            <a:schemeClr val="accent1"/>
+          </a:effectRef>
+          <a:fontRef idx="minor">
+            <a:schemeClr val="lt1"/>
+          </a:fontRef>
+        </p:style>
+        <p:txBody>
+          <a:bodyPr rtlCol="0" anchor="ctr"/>
+          <a:lstStyle/>
+          <a:p>
+            <a:pPr algn="ctr"/>
+          </a:p>
+        </p:txBody>
+      </p:sp>
+      <p:sp>
+        <p:nvSpPr>
+          <p:cNvPr id="3" name="TextBox 2"/>
+          <p:cNvSpPr txBox="1"/>
+          <p:nvPr/>
+        </p:nvSpPr>
+        <p:spPr>
+          <a:xfrm>
+            <a:off x="457200" y="548640"/>
+            <a:ext cx="10972800" cy="365760"/>
+          </a:xfrm>
+          <a:prstGeom prst="rect">
+            <a:avLst/>
+          </a:prstGeom>
+          <a:noFill/>
+        </p:spPr>
+        <p:txBody>
+          <a:bodyPr wrap="none">
+            <a:spAutoFit/>
+          </a:bodyPr>
+          <a:lstStyle/>
+          <a:p>
+            <a:pPr>
+              <a:defRPr sz="1400" b="1">
+                <a:solidFill>
+                  <a:srgbClr val="14B8A6"/>
+                </a:solidFill>
+              </a:defRPr>
+            </a:pPr>
+            <a:r>
+              <a:t>ENGINEERING PRINCIPLE</a:t>
+            </a:r>
+          </a:p>
+        </p:txBody>
+      </p:sp>
+      <p:sp>
+        <p:nvSpPr>
+          <p:cNvPr id="4" name="TextBox 3"/>
+          <p:cNvSpPr txBox="1"/>
+          <p:nvPr/>
+        </p:nvSpPr>
+        <p:spPr>
+          <a:xfrm>
+            <a:off x="457200" y="1097280"/>
+            <a:ext cx="10972800" cy="1828800"/>
+          </a:xfrm>
+          <a:prstGeom prst="rect">
+            <a:avLst/>
+          </a:prstGeom>
+          <a:noFill/>
+        </p:spPr>
+        <p:txBody>
+          <a:bodyPr wrap="square">
+            <a:spAutoFit/>
+          </a:bodyPr>
+          <a:lstStyle/>
+          <a:p>
+            <a:pPr>
+              <a:defRPr sz="4000" b="1">
+                <a:solidFill>
+                  <a:srgbClr val="FFFFFF"/>
+                </a:solidFill>
+              </a:defRPr>
+            </a:pPr>
+            <a:r>
+              <a:t>Separate Memory from Compute from Interface</a:t>
+            </a:r>
+          </a:p>
+        </p:txBody>
+      </p:sp>
+      <p:sp>
+        <p:nvSpPr>
+          <p:cNvPr id="5" name="TextBox 4"/>
+          <p:cNvSpPr txBox="1"/>
+          <p:nvPr/>
+        </p:nvSpPr>
+        <p:spPr>
+          <a:xfrm>
+            <a:off x="457200" y="3200400"/>
+            <a:ext cx="10058400" cy="3200400"/>
+          </a:xfrm>
+          <a:prstGeom prst="rect">
+            <a:avLst/>
+          </a:prstGeom>
+          <a:noFill/>
+        </p:spPr>
+        <p:txBody>
+          <a:bodyPr wrap="square">
+            <a:spAutoFit/>
+          </a:bodyPr>
+          <a:lstStyle/>
+          <a:p>
+            <a:pPr>
+              <a:defRPr sz="2000">
+                <a:solidFill>
+                  <a:srgbClr val="9CA3AF"/>
+                </a:solidFill>
+              </a:defRPr>
+            </a:pPr>
+            <a:r>
+              <a:t>Same Claude brain via chat, Desktop, API, Excel, automation. The interface changes — the intelligence doesn't.</a:t>
+            </a:r>
+          </a:p>
+        </p:txBody>
+      </p:sp>
+    </p:spTree>
+  </p:cSld>
+  <p:clrMapOvr>
+    <a:masterClrMapping/>
+  </p:clrMapOvr>
+</p:sld>
+</file>
+
+<file path=ppt/slides/slide84.xml><?xml version="1.0" encoding="utf-8"?>
+<p:sld xmlns:a="http://schemas.openxmlformats.org/drawingml/2006/main" xmlns:p="http://schemas.openxmlformats.org/presentationml/2006/main" xmlns:r="http://schemas.openxmlformats.org/officeDocument/2006/relationships">
+  <p:cSld>
+    <p:bg>
+      <p:bgPr>
+        <a:solidFill>
+          <a:srgbClr val="0B0F1A"/>
+        </a:solidFill>
+        <a:effectLst/>
+      </p:bgPr>
+    </p:bg>
+    <p:spTree>
+      <p:nvGrpSpPr>
+        <p:cNvPr id="1" name=""/>
+        <p:cNvGrpSpPr/>
+        <p:nvPr/>
+      </p:nvGrpSpPr>
+      <p:grpSpPr/>
+      <p:sp>
+        <p:nvSpPr>
+          <p:cNvPr id="2" name="Rectangle 1"/>
+          <p:cNvSpPr/>
+          <p:nvPr/>
+        </p:nvSpPr>
+        <p:spPr>
+          <a:xfrm>
+            <a:off x="457200" y="365760"/>
+            <a:ext cx="1371600" cy="36576"/>
+          </a:xfrm>
+          <a:prstGeom prst="rect">
+            <a:avLst/>
+          </a:prstGeom>
+          <a:solidFill>
+            <a:srgbClr val="14B8A6"/>
+          </a:solidFill>
+          <a:ln>
+            <a:noFill/>
+          </a:ln>
+        </p:spPr>
+        <p:style>
+          <a:lnRef idx="1">
+            <a:schemeClr val="accent1"/>
+          </a:lnRef>
+          <a:fillRef idx="3">
+            <a:schemeClr val="accent1"/>
+          </a:fillRef>
+          <a:effectRef idx="2">
+            <a:schemeClr val="accent1"/>
+          </a:effectRef>
+          <a:fontRef idx="minor">
+            <a:schemeClr val="lt1"/>
+          </a:fontRef>
+        </p:style>
+        <p:txBody>
+          <a:bodyPr rtlCol="0" anchor="ctr"/>
+          <a:lstStyle/>
+          <a:p>
+            <a:pPr algn="ctr"/>
+          </a:p>
+        </p:txBody>
+      </p:sp>
+      <p:sp>
+        <p:nvSpPr>
+          <p:cNvPr id="3" name="TextBox 2"/>
+          <p:cNvSpPr txBox="1"/>
+          <p:nvPr/>
+        </p:nvSpPr>
+        <p:spPr>
+          <a:xfrm>
+            <a:off x="457200" y="548640"/>
+            <a:ext cx="10972800" cy="365760"/>
+          </a:xfrm>
+          <a:prstGeom prst="rect">
+            <a:avLst/>
+          </a:prstGeom>
+          <a:noFill/>
+        </p:spPr>
+        <p:txBody>
+          <a:bodyPr wrap="none">
+            <a:spAutoFit/>
+          </a:bodyPr>
+          <a:lstStyle/>
+          <a:p>
+            <a:pPr>
+              <a:defRPr sz="1400" b="1">
+                <a:solidFill>
+                  <a:srgbClr val="14B8A6"/>
+                </a:solidFill>
+              </a:defRPr>
+            </a:pPr>
+            <a:r>
+              <a:t>ENGINEERING PRINCIPLE</a:t>
+            </a:r>
+          </a:p>
+        </p:txBody>
+      </p:sp>
+      <p:sp>
+        <p:nvSpPr>
+          <p:cNvPr id="4" name="TextBox 3"/>
+          <p:cNvSpPr txBox="1"/>
+          <p:nvPr/>
+        </p:nvSpPr>
+        <p:spPr>
+          <a:xfrm>
+            <a:off x="457200" y="1097280"/>
+            <a:ext cx="10972800" cy="1828800"/>
+          </a:xfrm>
+          <a:prstGeom prst="rect">
+            <a:avLst/>
+          </a:prstGeom>
+          <a:noFill/>
+        </p:spPr>
+        <p:txBody>
+          <a:bodyPr wrap="square">
+            <a:spAutoFit/>
+          </a:bodyPr>
+          <a:lstStyle/>
+          <a:p>
+            <a:pPr>
+              <a:defRPr sz="4000" b="1">
+                <a:solidFill>
+                  <a:srgbClr val="FFFFFF"/>
+                </a:solidFill>
+              </a:defRPr>
+            </a:pPr>
+            <a:r>
+              <a:t>Reduce the Human's Job to One Reliable Behavior</a:t>
+            </a:r>
+          </a:p>
+        </p:txBody>
+      </p:sp>
+      <p:sp>
+        <p:nvSpPr>
+          <p:cNvPr id="5" name="TextBox 4"/>
+          <p:cNvSpPr txBox="1"/>
+          <p:nvPr/>
+        </p:nvSpPr>
+        <p:spPr>
+          <a:xfrm>
+            <a:off x="457200" y="3200400"/>
+            <a:ext cx="10058400" cy="3200400"/>
+          </a:xfrm>
+          <a:prstGeom prst="rect">
+            <a:avLst/>
+          </a:prstGeom>
+          <a:noFill/>
+        </p:spPr>
+        <p:txBody>
+          <a:bodyPr wrap="square">
+            <a:spAutoFit/>
+          </a:bodyPr>
+          <a:lstStyle/>
+          <a:p>
+            <a:pPr>
+              <a:defRPr sz="2000">
+                <a:solidFill>
+                  <a:srgbClr val="9CA3AF"/>
+                </a:solidFill>
+              </a:defRPr>
+            </a:pPr>
+            <a:r>
+              <a:t>Your ONE job: brain dump. Claude handles structuring, formatting, routing. The messier the input, the more value.</a:t>
+            </a:r>
+          </a:p>
+        </p:txBody>
+      </p:sp>
+    </p:spTree>
+  </p:cSld>
+  <p:clrMapOvr>
+    <a:masterClrMapping/>
+  </p:clrMapOvr>
+</p:sld>
+</file>
+
+<file path=ppt/slides/slide85.xml><?xml version="1.0" encoding="utf-8"?>
+<p:sld xmlns:a="http://schemas.openxmlformats.org/drawingml/2006/main" xmlns:p="http://schemas.openxmlformats.org/presentationml/2006/main" xmlns:r="http://schemas.openxmlformats.org/officeDocument/2006/relationships">
+  <p:cSld>
+    <p:bg>
+      <p:bgPr>
+        <a:solidFill>
+          <a:srgbClr val="0B0F1A"/>
+        </a:solidFill>
+        <a:effectLst/>
+      </p:bgPr>
+    </p:bg>
+    <p:spTree>
+      <p:nvGrpSpPr>
+        <p:cNvPr id="1" name=""/>
+        <p:cNvGrpSpPr/>
+        <p:nvPr/>
+      </p:nvGrpSpPr>
+      <p:grpSpPr/>
+      <p:sp>
+        <p:nvSpPr>
+          <p:cNvPr id="2" name="Rectangle 1"/>
+          <p:cNvSpPr/>
+          <p:nvPr/>
+        </p:nvSpPr>
+        <p:spPr>
+          <a:xfrm>
+            <a:off x="457200" y="365760"/>
+            <a:ext cx="1371600" cy="36576"/>
+          </a:xfrm>
+          <a:prstGeom prst="rect">
+            <a:avLst/>
+          </a:prstGeom>
+          <a:solidFill>
+            <a:srgbClr val="14B8A6"/>
+          </a:solidFill>
+          <a:ln>
+            <a:noFill/>
+          </a:ln>
+        </p:spPr>
+        <p:style>
+          <a:lnRef idx="1">
+            <a:schemeClr val="accent1"/>
+          </a:lnRef>
+          <a:fillRef idx="3">
+            <a:schemeClr val="accent1"/>
+          </a:fillRef>
+          <a:effectRef idx="2">
+            <a:schemeClr val="accent1"/>
+          </a:effectRef>
+          <a:fontRef idx="minor">
+            <a:schemeClr val="lt1"/>
+          </a:fontRef>
+        </p:style>
+        <p:txBody>
+          <a:bodyPr rtlCol="0" anchor="ctr"/>
+          <a:lstStyle/>
+          <a:p>
+            <a:pPr algn="ctr"/>
+          </a:p>
+        </p:txBody>
+      </p:sp>
+      <p:sp>
+        <p:nvSpPr>
+          <p:cNvPr id="3" name="TextBox 2"/>
+          <p:cNvSpPr txBox="1"/>
+          <p:nvPr/>
+        </p:nvSpPr>
+        <p:spPr>
+          <a:xfrm>
+            <a:off x="457200" y="548640"/>
+            <a:ext cx="10972800" cy="365760"/>
+          </a:xfrm>
+          <a:prstGeom prst="rect">
+            <a:avLst/>
+          </a:prstGeom>
+          <a:noFill/>
+        </p:spPr>
+        <p:txBody>
+          <a:bodyPr wrap="none">
+            <a:spAutoFit/>
+          </a:bodyPr>
+          <a:lstStyle/>
+          <a:p>
+            <a:pPr>
+              <a:defRPr sz="1400" b="1">
+                <a:solidFill>
+                  <a:srgbClr val="14B8A6"/>
+                </a:solidFill>
+              </a:defRPr>
+            </a:pPr>
+            <a:r>
+              <a:t>ENGINEERING PRINCIPLE</a:t>
+            </a:r>
+          </a:p>
+        </p:txBody>
+      </p:sp>
+      <p:sp>
+        <p:nvSpPr>
+          <p:cNvPr id="4" name="TextBox 3"/>
+          <p:cNvSpPr txBox="1"/>
+          <p:nvPr/>
+        </p:nvSpPr>
+        <p:spPr>
+          <a:xfrm>
+            <a:off x="457200" y="1097280"/>
+            <a:ext cx="10972800" cy="1828800"/>
+          </a:xfrm>
+          <a:prstGeom prst="rect">
+            <a:avLst/>
+          </a:prstGeom>
+          <a:noFill/>
+        </p:spPr>
+        <p:txBody>
+          <a:bodyPr wrap="square">
+            <a:spAutoFit/>
+          </a:bodyPr>
+          <a:lstStyle/>
+          <a:p>
+            <a:pPr>
+              <a:defRPr sz="4000" b="1">
+                <a:solidFill>
+                  <a:srgbClr val="FFFFFF"/>
+                </a:solidFill>
+              </a:defRPr>
+            </a:pPr>
+            <a:r>
+              <a:t>Treat Prompts Like APIs, Not Creative Writing</a:t>
+            </a:r>
+          </a:p>
+        </p:txBody>
+      </p:sp>
+      <p:sp>
+        <p:nvSpPr>
+          <p:cNvPr id="5" name="TextBox 4"/>
+          <p:cNvSpPr txBox="1"/>
+          <p:nvPr/>
+        </p:nvSpPr>
+        <p:spPr>
+          <a:xfrm>
+            <a:off x="457200" y="3200400"/>
+            <a:ext cx="10058400" cy="3200400"/>
+          </a:xfrm>
+          <a:prstGeom prst="rect">
+            <a:avLst/>
+          </a:prstGeom>
+          <a:noFill/>
+        </p:spPr>
+        <p:txBody>
+          <a:bodyPr wrap="square">
+            <a:spAutoFit/>
+          </a:bodyPr>
+          <a:lstStyle/>
+          <a:p>
+            <a:pPr>
+              <a:defRPr sz="2000">
+                <a:solidFill>
+                  <a:srgbClr val="9CA3AF"/>
+                </a:solidFill>
+              </a:defRPr>
+            </a:pPr>
+            <a:r>
+              <a:t>Great prompts have defined inputs, expected outputs, and error handling — just like API contracts.</a:t>
+            </a:r>
+          </a:p>
+        </p:txBody>
+      </p:sp>
+    </p:spTree>
+  </p:cSld>
+  <p:clrMapOvr>
+    <a:masterClrMapping/>
+  </p:clrMapOvr>
+</p:sld>
+</file>
+
+<file path=ppt/slides/slide86.xml><?xml version="1.0" encoding="utf-8"?>
+<p:sld xmlns:a="http://schemas.openxmlformats.org/drawingml/2006/main" xmlns:p="http://schemas.openxmlformats.org/presentationml/2006/main" xmlns:r="http://schemas.openxmlformats.org/officeDocument/2006/relationships">
+  <p:cSld>
+    <p:bg>
+      <p:bgPr>
+        <a:solidFill>
+          <a:srgbClr val="0B0F1A"/>
+        </a:solidFill>
+        <a:effectLst/>
+      </p:bgPr>
+    </p:bg>
+    <p:spTree>
+      <p:nvGrpSpPr>
+        <p:cNvPr id="1" name=""/>
+        <p:cNvGrpSpPr/>
+        <p:nvPr/>
+      </p:nvGrpSpPr>
+      <p:grpSpPr/>
+      <p:sp>
+        <p:nvSpPr>
+          <p:cNvPr id="2" name="Rectangle 1"/>
+          <p:cNvSpPr/>
+          <p:nvPr/>
+        </p:nvSpPr>
+        <p:spPr>
+          <a:xfrm>
+            <a:off x="457200" y="365760"/>
+            <a:ext cx="1371600" cy="36576"/>
+          </a:xfrm>
+          <a:prstGeom prst="rect">
+            <a:avLst/>
+          </a:prstGeom>
+          <a:solidFill>
+            <a:srgbClr val="14B8A6"/>
+          </a:solidFill>
+          <a:ln>
+            <a:noFill/>
+          </a:ln>
+        </p:spPr>
+        <p:style>
+          <a:lnRef idx="1">
+            <a:schemeClr val="accent1"/>
+          </a:lnRef>
+          <a:fillRef idx="3">
+            <a:schemeClr val="accent1"/>
+          </a:fillRef>
+          <a:effectRef idx="2">
+            <a:schemeClr val="accent1"/>
+          </a:effectRef>
+          <a:fontRef idx="minor">
+            <a:schemeClr val="lt1"/>
+          </a:fontRef>
+        </p:style>
+        <p:txBody>
+          <a:bodyPr rtlCol="0" anchor="ctr"/>
+          <a:lstStyle/>
+          <a:p>
+            <a:pPr algn="ctr"/>
+          </a:p>
+        </p:txBody>
+      </p:sp>
+      <p:sp>
+        <p:nvSpPr>
+          <p:cNvPr id="3" name="TextBox 2"/>
+          <p:cNvSpPr txBox="1"/>
+          <p:nvPr/>
+        </p:nvSpPr>
+        <p:spPr>
+          <a:xfrm>
+            <a:off x="457200" y="548640"/>
+            <a:ext cx="10972800" cy="365760"/>
+          </a:xfrm>
+          <a:prstGeom prst="rect">
+            <a:avLst/>
+          </a:prstGeom>
+          <a:noFill/>
+        </p:spPr>
+        <p:txBody>
+          <a:bodyPr wrap="none">
+            <a:spAutoFit/>
+          </a:bodyPr>
+          <a:lstStyle/>
+          <a:p>
+            <a:pPr>
+              <a:defRPr sz="1400" b="1">
+                <a:solidFill>
+                  <a:srgbClr val="14B8A6"/>
+                </a:solidFill>
+              </a:defRPr>
+            </a:pPr>
+            <a:r>
+              <a:t>ENGINEERING PRINCIPLE</a:t>
+            </a:r>
+          </a:p>
+        </p:txBody>
+      </p:sp>
+      <p:sp>
+        <p:nvSpPr>
+          <p:cNvPr id="4" name="TextBox 3"/>
+          <p:cNvSpPr txBox="1"/>
+          <p:nvPr/>
+        </p:nvSpPr>
+        <p:spPr>
+          <a:xfrm>
+            <a:off x="457200" y="1097280"/>
+            <a:ext cx="10972800" cy="1828800"/>
+          </a:xfrm>
+          <a:prstGeom prst="rect">
+            <a:avLst/>
+          </a:prstGeom>
+          <a:noFill/>
+        </p:spPr>
+        <p:txBody>
+          <a:bodyPr wrap="square">
+            <a:spAutoFit/>
+          </a:bodyPr>
+          <a:lstStyle/>
+          <a:p>
+            <a:pPr>
+              <a:defRPr sz="4000" b="1">
+                <a:solidFill>
+                  <a:srgbClr val="FFFFFF"/>
+                </a:solidFill>
+              </a:defRPr>
+            </a:pPr>
+            <a:r>
+              <a:t>Build Trust Mechanisms, Not Just Capabilities</a:t>
+            </a:r>
+          </a:p>
+        </p:txBody>
+      </p:sp>
+      <p:sp>
+        <p:nvSpPr>
+          <p:cNvPr id="5" name="TextBox 4"/>
+          <p:cNvSpPr txBox="1"/>
+          <p:nvPr/>
+        </p:nvSpPr>
+        <p:spPr>
+          <a:xfrm>
+            <a:off x="457200" y="3200400"/>
+            <a:ext cx="10058400" cy="3200400"/>
+          </a:xfrm>
+          <a:prstGeom prst="rect">
+            <a:avLst/>
+          </a:prstGeom>
+          <a:noFill/>
+        </p:spPr>
+        <p:txBody>
+          <a:bodyPr wrap="square">
+            <a:spAutoFit/>
+          </a:bodyPr>
+          <a:lstStyle/>
+          <a:p>
+            <a:pPr>
+              <a:defRPr sz="2000">
+                <a:solidFill>
+                  <a:srgbClr val="9CA3AF"/>
+                </a:solidFill>
+              </a:defRPr>
+            </a:pPr>
+            <a:r>
+              <a:t>Verification &gt; capability. Confidence flags, source citations, uncertainty markers. Trust earned through transparency.</a:t>
             </a:r>
           </a:p>
         </p:txBody>

</xml_diff>